<commit_message>
Add slide about model
</commit_message>
<xml_diff>
--- a/프로젝트 중간발표_김민재, 송한결, 정유나.pptx
+++ b/프로젝트 중간발표_김민재, 송한결, 정유나.pptx
@@ -4,6 +4,9 @@
   <p:sldMasterIdLst>
     <p:sldMasterId id="2147483648" r:id="rId1"/>
   </p:sldMasterIdLst>
+  <p:notesMasterIdLst>
+    <p:notesMasterId r:id="rId10"/>
+  </p:notesMasterIdLst>
   <p:sldIdLst>
     <p:sldId id="256" r:id="rId2"/>
     <p:sldId id="258" r:id="rId3"/>
@@ -18,25 +21,29 @@
   <p:notesSz cx="6858000" cy="9144000"/>
   <p:embeddedFontLst>
     <p:embeddedFont>
+      <p:font typeface="나눔스퀘어_ac ExtraBold" panose="020B0600000101010101" pitchFamily="50" charset="-127"/>
+      <p:bold r:id="rId11"/>
+    </p:embeddedFont>
+    <p:embeddedFont>
       <p:font typeface="a옛날사진관2" panose="02020600000000000000" pitchFamily="18" charset="-127"/>
-      <p:regular r:id="rId10"/>
+      <p:regular r:id="rId12"/>
     </p:embeddedFont>
     <p:embeddedFont>
       <p:font typeface="나눔스퀘어_ac" panose="020B0600000101010101" pitchFamily="50" charset="-127"/>
-      <p:regular r:id="rId11"/>
+      <p:regular r:id="rId13"/>
     </p:embeddedFont>
     <p:embeddedFont>
       <p:font typeface="나눔스퀘어_ac Bold" panose="020B0600000101010101" pitchFamily="50" charset="-127"/>
-      <p:bold r:id="rId12"/>
+      <p:bold r:id="rId14"/>
     </p:embeddedFont>
     <p:embeddedFont>
       <p:font typeface="나눔스퀘어_ac Light" panose="020B0600000101010101" pitchFamily="50" charset="-127"/>
-      <p:regular r:id="rId13"/>
+      <p:regular r:id="rId15"/>
     </p:embeddedFont>
     <p:embeddedFont>
       <p:font typeface="맑은 고딕" panose="020B0503020000020004" pitchFamily="50" charset="-127"/>
-      <p:regular r:id="rId14"/>
-      <p:bold r:id="rId15"/>
+      <p:regular r:id="rId16"/>
+      <p:bold r:id="rId17"/>
     </p:embeddedFont>
   </p:embeddedFontLst>
   <p:defaultTextStyle>
@@ -142,6 +149,439 @@
 </p:presentation>
 </file>
 
+<file path=ppt/notesMasters/notesMaster1.xml><?xml version="1.0" encoding="utf-8"?>
+<p:notesMaster xmlns:a="http://schemas.openxmlformats.org/drawingml/2006/main" xmlns:r="http://schemas.openxmlformats.org/officeDocument/2006/relationships" xmlns:p="http://schemas.openxmlformats.org/presentationml/2006/main">
+  <p:cSld>
+    <p:bg>
+      <p:bgRef idx="1001">
+        <a:schemeClr val="bg1"/>
+      </p:bgRef>
+    </p:bg>
+    <p:spTree>
+      <p:nvGrpSpPr>
+        <p:cNvPr id="1" name=""/>
+        <p:cNvGrpSpPr/>
+        <p:nvPr/>
+      </p:nvGrpSpPr>
+      <p:grpSpPr>
+        <a:xfrm>
+          <a:off x="0" y="0"/>
+          <a:ext cx="0" cy="0"/>
+          <a:chOff x="0" y="0"/>
+          <a:chExt cx="0" cy="0"/>
+        </a:xfrm>
+      </p:grpSpPr>
+      <p:sp>
+        <p:nvSpPr>
+          <p:cNvPr id="2" name="머리글 개체 틀 1"/>
+          <p:cNvSpPr>
+            <a:spLocks noGrp="1"/>
+          </p:cNvSpPr>
+          <p:nvPr>
+            <p:ph type="hdr" sz="quarter"/>
+          </p:nvPr>
+        </p:nvSpPr>
+        <p:spPr>
+          <a:xfrm>
+            <a:off x="0" y="0"/>
+            <a:ext cx="2971800" cy="458788"/>
+          </a:xfrm>
+          <a:prstGeom prst="rect">
+            <a:avLst/>
+          </a:prstGeom>
+        </p:spPr>
+        <p:txBody>
+          <a:bodyPr vert="horz" lIns="91440" tIns="45720" rIns="91440" bIns="45720" rtlCol="0"/>
+          <a:lstStyle>
+            <a:lvl1pPr algn="l">
+              <a:defRPr sz="1200"/>
+            </a:lvl1pPr>
+          </a:lstStyle>
+          <a:p>
+            <a:endParaRPr lang="ko-KR" altLang="en-US"/>
+          </a:p>
+        </p:txBody>
+      </p:sp>
+      <p:sp>
+        <p:nvSpPr>
+          <p:cNvPr id="3" name="날짜 개체 틀 2"/>
+          <p:cNvSpPr>
+            <a:spLocks noGrp="1"/>
+          </p:cNvSpPr>
+          <p:nvPr>
+            <p:ph type="dt" idx="1"/>
+          </p:nvPr>
+        </p:nvSpPr>
+        <p:spPr>
+          <a:xfrm>
+            <a:off x="3884613" y="0"/>
+            <a:ext cx="2971800" cy="458788"/>
+          </a:xfrm>
+          <a:prstGeom prst="rect">
+            <a:avLst/>
+          </a:prstGeom>
+        </p:spPr>
+        <p:txBody>
+          <a:bodyPr vert="horz" lIns="91440" tIns="45720" rIns="91440" bIns="45720" rtlCol="0"/>
+          <a:lstStyle>
+            <a:lvl1pPr algn="r">
+              <a:defRPr sz="1200"/>
+            </a:lvl1pPr>
+          </a:lstStyle>
+          <a:p>
+            <a:fld id="{C7BB0ADA-3953-4347-8F62-53C6C46C138E}" type="datetimeFigureOut">
+              <a:rPr lang="ko-KR" altLang="en-US" smtClean="0"/>
+              <a:t>2020-11-29</a:t>
+            </a:fld>
+            <a:endParaRPr lang="ko-KR" altLang="en-US"/>
+          </a:p>
+        </p:txBody>
+      </p:sp>
+      <p:sp>
+        <p:nvSpPr>
+          <p:cNvPr id="4" name="슬라이드 이미지 개체 틀 3"/>
+          <p:cNvSpPr>
+            <a:spLocks noGrp="1" noRot="1" noChangeAspect="1"/>
+          </p:cNvSpPr>
+          <p:nvPr>
+            <p:ph type="sldImg" idx="2"/>
+          </p:nvPr>
+        </p:nvSpPr>
+        <p:spPr>
+          <a:xfrm>
+            <a:off x="685800" y="1143000"/>
+            <a:ext cx="5486400" cy="3086100"/>
+          </a:xfrm>
+          <a:prstGeom prst="rect">
+            <a:avLst/>
+          </a:prstGeom>
+          <a:noFill/>
+          <a:ln w="12700">
+            <a:solidFill>
+              <a:prstClr val="black"/>
+            </a:solidFill>
+          </a:ln>
+        </p:spPr>
+        <p:txBody>
+          <a:bodyPr vert="horz" lIns="91440" tIns="45720" rIns="91440" bIns="45720" rtlCol="0" anchor="ctr"/>
+          <a:lstStyle/>
+          <a:p>
+            <a:endParaRPr lang="ko-KR" altLang="en-US"/>
+          </a:p>
+        </p:txBody>
+      </p:sp>
+      <p:sp>
+        <p:nvSpPr>
+          <p:cNvPr id="5" name="슬라이드 노트 개체 틀 4"/>
+          <p:cNvSpPr>
+            <a:spLocks noGrp="1"/>
+          </p:cNvSpPr>
+          <p:nvPr>
+            <p:ph type="body" sz="quarter" idx="3"/>
+          </p:nvPr>
+        </p:nvSpPr>
+        <p:spPr>
+          <a:xfrm>
+            <a:off x="685800" y="4400550"/>
+            <a:ext cx="5486400" cy="3600450"/>
+          </a:xfrm>
+          <a:prstGeom prst="rect">
+            <a:avLst/>
+          </a:prstGeom>
+        </p:spPr>
+        <p:txBody>
+          <a:bodyPr vert="horz" lIns="91440" tIns="45720" rIns="91440" bIns="45720" rtlCol="0"/>
+          <a:lstStyle/>
+          <a:p>
+            <a:pPr lvl="0"/>
+            <a:r>
+              <a:rPr lang="ko-KR" altLang="en-US"/>
+              <a:t>마스터 텍스트 스타일을 편집하려면 클릭</a:t>
+            </a:r>
+          </a:p>
+          <a:p>
+            <a:pPr lvl="1"/>
+            <a:r>
+              <a:rPr lang="ko-KR" altLang="en-US"/>
+              <a:t>두 번째 수준</a:t>
+            </a:r>
+          </a:p>
+          <a:p>
+            <a:pPr lvl="2"/>
+            <a:r>
+              <a:rPr lang="ko-KR" altLang="en-US"/>
+              <a:t>세 번째 수준</a:t>
+            </a:r>
+          </a:p>
+          <a:p>
+            <a:pPr lvl="3"/>
+            <a:r>
+              <a:rPr lang="ko-KR" altLang="en-US"/>
+              <a:t>네 번째 수준</a:t>
+            </a:r>
+          </a:p>
+          <a:p>
+            <a:pPr lvl="4"/>
+            <a:r>
+              <a:rPr lang="ko-KR" altLang="en-US"/>
+              <a:t>다섯 번째 수준</a:t>
+            </a:r>
+          </a:p>
+        </p:txBody>
+      </p:sp>
+      <p:sp>
+        <p:nvSpPr>
+          <p:cNvPr id="6" name="바닥글 개체 틀 5"/>
+          <p:cNvSpPr>
+            <a:spLocks noGrp="1"/>
+          </p:cNvSpPr>
+          <p:nvPr>
+            <p:ph type="ftr" sz="quarter" idx="4"/>
+          </p:nvPr>
+        </p:nvSpPr>
+        <p:spPr>
+          <a:xfrm>
+            <a:off x="0" y="8685213"/>
+            <a:ext cx="2971800" cy="458787"/>
+          </a:xfrm>
+          <a:prstGeom prst="rect">
+            <a:avLst/>
+          </a:prstGeom>
+        </p:spPr>
+        <p:txBody>
+          <a:bodyPr vert="horz" lIns="91440" tIns="45720" rIns="91440" bIns="45720" rtlCol="0" anchor="b"/>
+          <a:lstStyle>
+            <a:lvl1pPr algn="l">
+              <a:defRPr sz="1200"/>
+            </a:lvl1pPr>
+          </a:lstStyle>
+          <a:p>
+            <a:endParaRPr lang="ko-KR" altLang="en-US"/>
+          </a:p>
+        </p:txBody>
+      </p:sp>
+      <p:sp>
+        <p:nvSpPr>
+          <p:cNvPr id="7" name="슬라이드 번호 개체 틀 6"/>
+          <p:cNvSpPr>
+            <a:spLocks noGrp="1"/>
+          </p:cNvSpPr>
+          <p:nvPr>
+            <p:ph type="sldNum" sz="quarter" idx="5"/>
+          </p:nvPr>
+        </p:nvSpPr>
+        <p:spPr>
+          <a:xfrm>
+            <a:off x="3884613" y="8685213"/>
+            <a:ext cx="2971800" cy="458787"/>
+          </a:xfrm>
+          <a:prstGeom prst="rect">
+            <a:avLst/>
+          </a:prstGeom>
+        </p:spPr>
+        <p:txBody>
+          <a:bodyPr vert="horz" lIns="91440" tIns="45720" rIns="91440" bIns="45720" rtlCol="0" anchor="b"/>
+          <a:lstStyle>
+            <a:lvl1pPr algn="r">
+              <a:defRPr sz="1200"/>
+            </a:lvl1pPr>
+          </a:lstStyle>
+          <a:p>
+            <a:fld id="{BA313106-FF05-4C61-9E66-C0451B46BA4D}" type="slidenum">
+              <a:rPr lang="ko-KR" altLang="en-US" smtClean="0"/>
+              <a:t>‹#›</a:t>
+            </a:fld>
+            <a:endParaRPr lang="ko-KR" altLang="en-US"/>
+          </a:p>
+        </p:txBody>
+      </p:sp>
+    </p:spTree>
+    <p:extLst>
+      <p:ext uri="{BB962C8B-B14F-4D97-AF65-F5344CB8AC3E}">
+        <p14:creationId xmlns:p14="http://schemas.microsoft.com/office/powerpoint/2010/main" val="2127278540"/>
+      </p:ext>
+    </p:extLst>
+  </p:cSld>
+  <p:clrMap bg1="lt1" tx1="dk1" bg2="lt2" tx2="dk2" accent1="accent1" accent2="accent2" accent3="accent3" accent4="accent4" accent5="accent5" accent6="accent6" hlink="hlink" folHlink="folHlink"/>
+  <p:notesStyle>
+    <a:lvl1pPr marL="0" algn="l" defTabSz="914400" rtl="0" eaLnBrk="1" latinLnBrk="1" hangingPunct="1">
+      <a:defRPr sz="1200" kern="1200">
+        <a:solidFill>
+          <a:schemeClr val="tx1"/>
+        </a:solidFill>
+        <a:latin typeface="+mn-lt"/>
+        <a:ea typeface="+mn-ea"/>
+        <a:cs typeface="+mn-cs"/>
+      </a:defRPr>
+    </a:lvl1pPr>
+    <a:lvl2pPr marL="457200" algn="l" defTabSz="914400" rtl="0" eaLnBrk="1" latinLnBrk="1" hangingPunct="1">
+      <a:defRPr sz="1200" kern="1200">
+        <a:solidFill>
+          <a:schemeClr val="tx1"/>
+        </a:solidFill>
+        <a:latin typeface="+mn-lt"/>
+        <a:ea typeface="+mn-ea"/>
+        <a:cs typeface="+mn-cs"/>
+      </a:defRPr>
+    </a:lvl2pPr>
+    <a:lvl3pPr marL="914400" algn="l" defTabSz="914400" rtl="0" eaLnBrk="1" latinLnBrk="1" hangingPunct="1">
+      <a:defRPr sz="1200" kern="1200">
+        <a:solidFill>
+          <a:schemeClr val="tx1"/>
+        </a:solidFill>
+        <a:latin typeface="+mn-lt"/>
+        <a:ea typeface="+mn-ea"/>
+        <a:cs typeface="+mn-cs"/>
+      </a:defRPr>
+    </a:lvl3pPr>
+    <a:lvl4pPr marL="1371600" algn="l" defTabSz="914400" rtl="0" eaLnBrk="1" latinLnBrk="1" hangingPunct="1">
+      <a:defRPr sz="1200" kern="1200">
+        <a:solidFill>
+          <a:schemeClr val="tx1"/>
+        </a:solidFill>
+        <a:latin typeface="+mn-lt"/>
+        <a:ea typeface="+mn-ea"/>
+        <a:cs typeface="+mn-cs"/>
+      </a:defRPr>
+    </a:lvl4pPr>
+    <a:lvl5pPr marL="1828800" algn="l" defTabSz="914400" rtl="0" eaLnBrk="1" latinLnBrk="1" hangingPunct="1">
+      <a:defRPr sz="1200" kern="1200">
+        <a:solidFill>
+          <a:schemeClr val="tx1"/>
+        </a:solidFill>
+        <a:latin typeface="+mn-lt"/>
+        <a:ea typeface="+mn-ea"/>
+        <a:cs typeface="+mn-cs"/>
+      </a:defRPr>
+    </a:lvl5pPr>
+    <a:lvl6pPr marL="2286000" algn="l" defTabSz="914400" rtl="0" eaLnBrk="1" latinLnBrk="1" hangingPunct="1">
+      <a:defRPr sz="1200" kern="1200">
+        <a:solidFill>
+          <a:schemeClr val="tx1"/>
+        </a:solidFill>
+        <a:latin typeface="+mn-lt"/>
+        <a:ea typeface="+mn-ea"/>
+        <a:cs typeface="+mn-cs"/>
+      </a:defRPr>
+    </a:lvl6pPr>
+    <a:lvl7pPr marL="2743200" algn="l" defTabSz="914400" rtl="0" eaLnBrk="1" latinLnBrk="1" hangingPunct="1">
+      <a:defRPr sz="1200" kern="1200">
+        <a:solidFill>
+          <a:schemeClr val="tx1"/>
+        </a:solidFill>
+        <a:latin typeface="+mn-lt"/>
+        <a:ea typeface="+mn-ea"/>
+        <a:cs typeface="+mn-cs"/>
+      </a:defRPr>
+    </a:lvl7pPr>
+    <a:lvl8pPr marL="3200400" algn="l" defTabSz="914400" rtl="0" eaLnBrk="1" latinLnBrk="1" hangingPunct="1">
+      <a:defRPr sz="1200" kern="1200">
+        <a:solidFill>
+          <a:schemeClr val="tx1"/>
+        </a:solidFill>
+        <a:latin typeface="+mn-lt"/>
+        <a:ea typeface="+mn-ea"/>
+        <a:cs typeface="+mn-cs"/>
+      </a:defRPr>
+    </a:lvl8pPr>
+    <a:lvl9pPr marL="3657600" algn="l" defTabSz="914400" rtl="0" eaLnBrk="1" latinLnBrk="1" hangingPunct="1">
+      <a:defRPr sz="1200" kern="1200">
+        <a:solidFill>
+          <a:schemeClr val="tx1"/>
+        </a:solidFill>
+        <a:latin typeface="+mn-lt"/>
+        <a:ea typeface="+mn-ea"/>
+        <a:cs typeface="+mn-cs"/>
+      </a:defRPr>
+    </a:lvl9pPr>
+  </p:notesStyle>
+</p:notesMaster>
+</file>
+
+<file path=ppt/notesSlides/notesSlide1.xml><?xml version="1.0" encoding="utf-8"?>
+<p:notes xmlns:a="http://schemas.openxmlformats.org/drawingml/2006/main" xmlns:r="http://schemas.openxmlformats.org/officeDocument/2006/relationships" xmlns:p="http://schemas.openxmlformats.org/presentationml/2006/main">
+  <p:cSld>
+    <p:spTree>
+      <p:nvGrpSpPr>
+        <p:cNvPr id="1" name=""/>
+        <p:cNvGrpSpPr/>
+        <p:nvPr/>
+      </p:nvGrpSpPr>
+      <p:grpSpPr>
+        <a:xfrm>
+          <a:off x="0" y="0"/>
+          <a:ext cx="0" cy="0"/>
+          <a:chOff x="0" y="0"/>
+          <a:chExt cx="0" cy="0"/>
+        </a:xfrm>
+      </p:grpSpPr>
+      <p:sp>
+        <p:nvSpPr>
+          <p:cNvPr id="2" name="슬라이드 이미지 개체 틀 1"/>
+          <p:cNvSpPr>
+            <a:spLocks noGrp="1" noRot="1" noChangeAspect="1"/>
+          </p:cNvSpPr>
+          <p:nvPr>
+            <p:ph type="sldImg"/>
+          </p:nvPr>
+        </p:nvSpPr>
+        <p:spPr/>
+      </p:sp>
+      <p:sp>
+        <p:nvSpPr>
+          <p:cNvPr id="3" name="슬라이드 노트 개체 틀 2"/>
+          <p:cNvSpPr>
+            <a:spLocks noGrp="1"/>
+          </p:cNvSpPr>
+          <p:nvPr>
+            <p:ph type="body" idx="1"/>
+          </p:nvPr>
+        </p:nvSpPr>
+        <p:spPr/>
+        <p:txBody>
+          <a:bodyPr/>
+          <a:lstStyle/>
+          <a:p>
+            <a:endParaRPr lang="ko-KR" altLang="en-US" dirty="0"/>
+          </a:p>
+        </p:txBody>
+      </p:sp>
+      <p:sp>
+        <p:nvSpPr>
+          <p:cNvPr id="4" name="슬라이드 번호 개체 틀 3"/>
+          <p:cNvSpPr>
+            <a:spLocks noGrp="1"/>
+          </p:cNvSpPr>
+          <p:nvPr>
+            <p:ph type="sldNum" sz="quarter" idx="5"/>
+          </p:nvPr>
+        </p:nvSpPr>
+        <p:spPr/>
+        <p:txBody>
+          <a:bodyPr/>
+          <a:lstStyle/>
+          <a:p>
+            <a:fld id="{BA313106-FF05-4C61-9E66-C0451B46BA4D}" type="slidenum">
+              <a:rPr lang="ko-KR" altLang="en-US" smtClean="0"/>
+              <a:t>5</a:t>
+            </a:fld>
+            <a:endParaRPr lang="ko-KR" altLang="en-US"/>
+          </a:p>
+        </p:txBody>
+      </p:sp>
+    </p:spTree>
+    <p:extLst>
+      <p:ext uri="{BB962C8B-B14F-4D97-AF65-F5344CB8AC3E}">
+        <p14:creationId xmlns:p14="http://schemas.microsoft.com/office/powerpoint/2010/main" val="598484470"/>
+      </p:ext>
+    </p:extLst>
+  </p:cSld>
+  <p:clrMapOvr>
+    <a:masterClrMapping/>
+  </p:clrMapOvr>
+</p:notes>
+</file>
+
 <file path=ppt/slideLayouts/slideLayout1.xml><?xml version="1.0" encoding="utf-8"?>
 <p:sldLayout xmlns:a="http://schemas.openxmlformats.org/drawingml/2006/main" xmlns:r="http://schemas.openxmlformats.org/officeDocument/2006/relationships" xmlns:p="http://schemas.openxmlformats.org/presentationml/2006/main" type="title" preserve="1">
   <p:cSld name="제목 슬라이드">
@@ -289,7 +729,7 @@
           <a:p>
             <a:fld id="{9059EAB1-2C2F-44E2-9002-5C27AA55973B}" type="datetimeFigureOut">
               <a:rPr lang="ko-KR" altLang="en-US" smtClean="0"/>
-              <a:t>2020-11-28</a:t>
+              <a:t>2020-11-29</a:t>
             </a:fld>
             <a:endParaRPr lang="ko-KR" altLang="en-US"/>
           </a:p>
@@ -487,7 +927,7 @@
           <a:p>
             <a:fld id="{9059EAB1-2C2F-44E2-9002-5C27AA55973B}" type="datetimeFigureOut">
               <a:rPr lang="ko-KR" altLang="en-US" smtClean="0"/>
-              <a:t>2020-11-28</a:t>
+              <a:t>2020-11-29</a:t>
             </a:fld>
             <a:endParaRPr lang="ko-KR" altLang="en-US"/>
           </a:p>
@@ -695,7 +1135,7 @@
           <a:p>
             <a:fld id="{9059EAB1-2C2F-44E2-9002-5C27AA55973B}" type="datetimeFigureOut">
               <a:rPr lang="ko-KR" altLang="en-US" smtClean="0"/>
-              <a:t>2020-11-28</a:t>
+              <a:t>2020-11-29</a:t>
             </a:fld>
             <a:endParaRPr lang="ko-KR" altLang="en-US"/>
           </a:p>
@@ -893,7 +1333,7 @@
           <a:p>
             <a:fld id="{9059EAB1-2C2F-44E2-9002-5C27AA55973B}" type="datetimeFigureOut">
               <a:rPr lang="ko-KR" altLang="en-US" smtClean="0"/>
-              <a:t>2020-11-28</a:t>
+              <a:t>2020-11-29</a:t>
             </a:fld>
             <a:endParaRPr lang="ko-KR" altLang="en-US"/>
           </a:p>
@@ -1168,7 +1608,7 @@
           <a:p>
             <a:fld id="{9059EAB1-2C2F-44E2-9002-5C27AA55973B}" type="datetimeFigureOut">
               <a:rPr lang="ko-KR" altLang="en-US" smtClean="0"/>
-              <a:t>2020-11-28</a:t>
+              <a:t>2020-11-29</a:t>
             </a:fld>
             <a:endParaRPr lang="ko-KR" altLang="en-US"/>
           </a:p>
@@ -1433,7 +1873,7 @@
           <a:p>
             <a:fld id="{9059EAB1-2C2F-44E2-9002-5C27AA55973B}" type="datetimeFigureOut">
               <a:rPr lang="ko-KR" altLang="en-US" smtClean="0"/>
-              <a:t>2020-11-28</a:t>
+              <a:t>2020-11-29</a:t>
             </a:fld>
             <a:endParaRPr lang="ko-KR" altLang="en-US"/>
           </a:p>
@@ -1845,7 +2285,7 @@
           <a:p>
             <a:fld id="{9059EAB1-2C2F-44E2-9002-5C27AA55973B}" type="datetimeFigureOut">
               <a:rPr lang="ko-KR" altLang="en-US" smtClean="0"/>
-              <a:t>2020-11-28</a:t>
+              <a:t>2020-11-29</a:t>
             </a:fld>
             <a:endParaRPr lang="ko-KR" altLang="en-US"/>
           </a:p>
@@ -1986,7 +2426,7 @@
           <a:p>
             <a:fld id="{9059EAB1-2C2F-44E2-9002-5C27AA55973B}" type="datetimeFigureOut">
               <a:rPr lang="ko-KR" altLang="en-US" smtClean="0"/>
-              <a:t>2020-11-28</a:t>
+              <a:t>2020-11-29</a:t>
             </a:fld>
             <a:endParaRPr lang="ko-KR" altLang="en-US"/>
           </a:p>
@@ -2099,7 +2539,7 @@
           <a:p>
             <a:fld id="{9059EAB1-2C2F-44E2-9002-5C27AA55973B}" type="datetimeFigureOut">
               <a:rPr lang="ko-KR" altLang="en-US" smtClean="0"/>
-              <a:t>2020-11-28</a:t>
+              <a:t>2020-11-29</a:t>
             </a:fld>
             <a:endParaRPr lang="ko-KR" altLang="en-US"/>
           </a:p>
@@ -2410,7 +2850,7 @@
           <a:p>
             <a:fld id="{9059EAB1-2C2F-44E2-9002-5C27AA55973B}" type="datetimeFigureOut">
               <a:rPr lang="ko-KR" altLang="en-US" smtClean="0"/>
-              <a:t>2020-11-28</a:t>
+              <a:t>2020-11-29</a:t>
             </a:fld>
             <a:endParaRPr lang="ko-KR" altLang="en-US"/>
           </a:p>
@@ -2698,7 +3138,7 @@
           <a:p>
             <a:fld id="{9059EAB1-2C2F-44E2-9002-5C27AA55973B}" type="datetimeFigureOut">
               <a:rPr lang="ko-KR" altLang="en-US" smtClean="0"/>
-              <a:t>2020-11-28</a:t>
+              <a:t>2020-11-29</a:t>
             </a:fld>
             <a:endParaRPr lang="ko-KR" altLang="en-US"/>
           </a:p>
@@ -2939,7 +3379,7 @@
           <a:p>
             <a:fld id="{9059EAB1-2C2F-44E2-9002-5C27AA55973B}" type="datetimeFigureOut">
               <a:rPr lang="ko-KR" altLang="en-US" smtClean="0"/>
-              <a:t>2020-11-28</a:t>
+              <a:t>2020-11-29</a:t>
             </a:fld>
             <a:endParaRPr lang="ko-KR" altLang="en-US"/>
           </a:p>
@@ -6068,62 +6508,62 @@
           <a:lstStyle/>
           <a:p>
             <a:r>
-              <a:rPr lang="ko-KR" altLang="en-US" sz="1600">
+              <a:rPr lang="ko-KR" altLang="en-US" sz="1600" dirty="0">
                 <a:latin typeface="나눔스퀘어_ac" panose="020B0600000101010101" pitchFamily="50" charset="-127"/>
                 <a:ea typeface="나눔스퀘어_ac" panose="020B0600000101010101" pitchFamily="50" charset="-127"/>
               </a:rPr>
               <a:t>분석 프레임워크</a:t>
             </a:r>
             <a:r>
-              <a:rPr lang="en-US" altLang="ko-KR" sz="1600">
+              <a:rPr lang="en-US" altLang="ko-KR" sz="1600" dirty="0">
                 <a:latin typeface="나눔스퀘어_ac" panose="020B0600000101010101" pitchFamily="50" charset="-127"/>
                 <a:ea typeface="나눔스퀘어_ac" panose="020B0600000101010101" pitchFamily="50" charset="-127"/>
               </a:rPr>
               <a:t>:  </a:t>
             </a:r>
             <a:r>
-              <a:rPr lang="ko-KR" altLang="en-US" sz="2400">
+              <a:rPr lang="ko-KR" altLang="en-US" sz="2400" dirty="0">
                 <a:latin typeface="나눔스퀘어_ac Bold" panose="020B0600000101010101" pitchFamily="50" charset="-127"/>
                 <a:ea typeface="나눔스퀘어_ac Bold" panose="020B0600000101010101" pitchFamily="50" charset="-127"/>
               </a:rPr>
               <a:t>클러스터링</a:t>
             </a:r>
             <a:r>
-              <a:rPr lang="ko-KR" altLang="en-US" sz="2400">
+              <a:rPr lang="ko-KR" altLang="en-US" sz="2400" dirty="0">
                 <a:latin typeface="나눔스퀘어_ac" panose="020B0600000101010101" pitchFamily="50" charset="-127"/>
                 <a:ea typeface="나눔스퀘어_ac" panose="020B0600000101010101" pitchFamily="50" charset="-127"/>
               </a:rPr>
               <a:t>   </a:t>
             </a:r>
             <a:r>
-              <a:rPr lang="en-US" altLang="ko-KR" sz="2400">
+              <a:rPr lang="en-US" altLang="ko-KR" sz="2400" dirty="0">
                 <a:latin typeface="나눔스퀘어_ac" panose="020B0600000101010101" pitchFamily="50" charset="-127"/>
                 <a:ea typeface="나눔스퀘어_ac" panose="020B0600000101010101" pitchFamily="50" charset="-127"/>
               </a:rPr>
               <a:t>/   </a:t>
             </a:r>
             <a:r>
-              <a:rPr lang="ko-KR" altLang="en-US" sz="1600">
+              <a:rPr lang="ko-KR" altLang="en-US" sz="1600" dirty="0">
                 <a:latin typeface="나눔스퀘어_ac" panose="020B0600000101010101" pitchFamily="50" charset="-127"/>
                 <a:ea typeface="나눔스퀘어_ac" panose="020B0600000101010101" pitchFamily="50" charset="-127"/>
               </a:rPr>
               <a:t>알고리즘</a:t>
             </a:r>
             <a:r>
-              <a:rPr lang="en-US" altLang="ko-KR" sz="1600">
+              <a:rPr lang="en-US" altLang="ko-KR" sz="1600" dirty="0">
                 <a:latin typeface="나눔스퀘어_ac" panose="020B0600000101010101" pitchFamily="50" charset="-127"/>
                 <a:ea typeface="나눔스퀘어_ac" panose="020B0600000101010101" pitchFamily="50" charset="-127"/>
               </a:rPr>
               <a:t>:  </a:t>
             </a:r>
             <a:r>
-              <a:rPr lang="en-US" altLang="ko-KR" sz="2400">
+              <a:rPr lang="en-US" altLang="ko-KR" sz="2400" dirty="0">
                 <a:latin typeface="나눔스퀘어_ac Bold" panose="020B0600000101010101" pitchFamily="50" charset="-127"/>
                 <a:ea typeface="나눔스퀘어_ac Bold" panose="020B0600000101010101" pitchFamily="50" charset="-127"/>
               </a:rPr>
               <a:t>K-means clustering</a:t>
             </a:r>
-            <a:endParaRPr lang="en-US" altLang="ko-KR" sz="2000">
+            <a:endParaRPr lang="en-US" altLang="ko-KR" sz="2000" dirty="0">
               <a:latin typeface="나눔스퀘어_ac Bold" panose="020B0600000101010101" pitchFamily="50" charset="-127"/>
               <a:ea typeface="나눔스퀘어_ac Bold" panose="020B0600000101010101" pitchFamily="50" charset="-127"/>
             </a:endParaRPr>
@@ -6265,97 +6705,104 @@
           <a:p>
             <a:pPr algn="just"/>
             <a:r>
-              <a:rPr lang="ko-KR" altLang="en-US" sz="1600">
+              <a:rPr lang="ko-KR" altLang="en-US" sz="1600" dirty="0">
                 <a:latin typeface="나눔스퀘어_ac" panose="020B0600000101010101" pitchFamily="50" charset="-127"/>
                 <a:ea typeface="나눔스퀘어_ac" panose="020B0600000101010101" pitchFamily="50" charset="-127"/>
               </a:rPr>
               <a:t>학습 데이터 정의</a:t>
             </a:r>
             <a:r>
-              <a:rPr lang="en-US" altLang="ko-KR" sz="1600">
+              <a:rPr lang="en-US" altLang="ko-KR" sz="1600" dirty="0">
                 <a:latin typeface="나눔스퀘어_ac" panose="020B0600000101010101" pitchFamily="50" charset="-127"/>
                 <a:ea typeface="나눔스퀘어_ac" panose="020B0600000101010101" pitchFamily="50" charset="-127"/>
               </a:rPr>
               <a:t>:   e.g. </a:t>
             </a:r>
             <a:r>
-              <a:rPr lang="ko-KR" altLang="en-US" sz="1600">
+              <a:rPr lang="ko-KR" altLang="en-US" sz="1600" dirty="0">
                 <a:latin typeface="나눔스퀘어_ac" panose="020B0600000101010101" pitchFamily="50" charset="-127"/>
                 <a:ea typeface="나눔스퀘어_ac" panose="020B0600000101010101" pitchFamily="50" charset="-127"/>
               </a:rPr>
               <a:t>강남역</a:t>
             </a:r>
             <a:r>
-              <a:rPr lang="en-US" altLang="ko-KR" sz="1600">
+              <a:rPr lang="en-US" altLang="ko-KR" sz="1600" dirty="0">
                 <a:latin typeface="나눔스퀘어_ac" panose="020B0600000101010101" pitchFamily="50" charset="-127"/>
                 <a:ea typeface="나눔스퀘어_ac" panose="020B0600000101010101" pitchFamily="50" charset="-127"/>
               </a:rPr>
               <a:t>, 20</a:t>
             </a:r>
             <a:r>
-              <a:rPr lang="ko-KR" altLang="en-US" sz="1600">
+              <a:rPr lang="ko-KR" altLang="en-US" sz="1600" dirty="0">
                 <a:latin typeface="나눔스퀘어_ac" panose="020B0600000101010101" pitchFamily="50" charset="-127"/>
                 <a:ea typeface="나눔스퀘어_ac" panose="020B0600000101010101" pitchFamily="50" charset="-127"/>
               </a:rPr>
               <a:t>대 남성</a:t>
             </a:r>
             <a:r>
-              <a:rPr lang="en-US" altLang="ko-KR" sz="1600">
+              <a:rPr lang="en-US" altLang="ko-KR" sz="1600" dirty="0">
                 <a:latin typeface="나눔스퀘어_ac" panose="020B0600000101010101" pitchFamily="50" charset="-127"/>
                 <a:ea typeface="나눔스퀘어_ac" panose="020B0600000101010101" pitchFamily="50" charset="-127"/>
               </a:rPr>
               <a:t>, </a:t>
             </a:r>
             <a:r>
-              <a:rPr lang="ko-KR" altLang="en-US" sz="1600">
+              <a:rPr lang="ko-KR" altLang="en-US" sz="1600" dirty="0">
                 <a:latin typeface="나눔스퀘어_ac" panose="020B0600000101010101" pitchFamily="50" charset="-127"/>
                 <a:ea typeface="나눔스퀘어_ac" panose="020B0600000101010101" pitchFamily="50" charset="-127"/>
               </a:rPr>
               <a:t>출근시간 광고효과지수   </a:t>
             </a:r>
             <a:r>
-              <a:rPr lang="en-US" altLang="ko-KR" sz="1600">
+              <a:rPr lang="en-US" altLang="ko-KR" sz="1600" dirty="0">
                 <a:latin typeface="나눔스퀘어_ac" panose="020B0600000101010101" pitchFamily="50" charset="-127"/>
                 <a:ea typeface="나눔스퀘어_ac" panose="020B0600000101010101" pitchFamily="50" charset="-127"/>
               </a:rPr>
               <a:t>=    </a:t>
             </a:r>
             <a:r>
-              <a:rPr lang="ko-KR" altLang="en-US" sz="2400">
+              <a:rPr lang="ko-KR" altLang="en-US" sz="2400" dirty="0">
                 <a:latin typeface="나눔스퀘어_ac" panose="020B0600000101010101" pitchFamily="50" charset="-127"/>
                 <a:ea typeface="나눔스퀘어_ac" panose="020B0600000101010101" pitchFamily="50" charset="-127"/>
               </a:rPr>
               <a:t>강남역 </a:t>
             </a:r>
             <a:r>
-              <a:rPr lang="en-US" altLang="ko-KR" sz="2400">
+              <a:rPr lang="en-US" altLang="ko-KR" sz="2400" dirty="0">
                 <a:latin typeface="나눔스퀘어_ac" panose="020B0600000101010101" pitchFamily="50" charset="-127"/>
                 <a:ea typeface="나눔스퀘어_ac" panose="020B0600000101010101" pitchFamily="50" charset="-127"/>
               </a:rPr>
               <a:t>5</a:t>
             </a:r>
             <a:r>
-              <a:rPr lang="ko-KR" altLang="en-US" sz="2400">
+              <a:rPr lang="ko-KR" altLang="en-US" sz="2400" dirty="0">
                 <a:latin typeface="나눔스퀘어_ac" panose="020B0600000101010101" pitchFamily="50" charset="-127"/>
                 <a:ea typeface="나눔스퀘어_ac" panose="020B0600000101010101" pitchFamily="50" charset="-127"/>
               </a:rPr>
               <a:t>시</a:t>
             </a:r>
             <a:r>
-              <a:rPr lang="en-US" altLang="ko-KR" sz="2400">
+              <a:rPr lang="en-US" altLang="ko-KR" sz="2400" dirty="0">
                 <a:latin typeface="나눔스퀘어_ac" panose="020B0600000101010101" pitchFamily="50" charset="-127"/>
                 <a:ea typeface="나눔스퀘어_ac" panose="020B0600000101010101" pitchFamily="50" charset="-127"/>
               </a:rPr>
               <a:t>-10</a:t>
             </a:r>
             <a:r>
-              <a:rPr lang="ko-KR" altLang="en-US" sz="2400">
+              <a:rPr lang="ko-KR" altLang="en-US" sz="2400" dirty="0">
                 <a:latin typeface="나눔스퀘어_ac" panose="020B0600000101010101" pitchFamily="50" charset="-127"/>
                 <a:ea typeface="나눔스퀘어_ac" panose="020B0600000101010101" pitchFamily="50" charset="-127"/>
               </a:rPr>
-              <a:t>시 승하차인원</a:t>
-            </a:r>
-            <a:endParaRPr lang="en-US" altLang="ko-KR" sz="2400">
+              <a:t>시 </a:t>
+            </a:r>
+            <a:r>
+              <a:rPr lang="ko-KR" altLang="en-US" sz="2400" dirty="0" err="1">
+                <a:latin typeface="나눔스퀘어_ac" panose="020B0600000101010101" pitchFamily="50" charset="-127"/>
+                <a:ea typeface="나눔스퀘어_ac" panose="020B0600000101010101" pitchFamily="50" charset="-127"/>
+              </a:rPr>
+              <a:t>승하차인원</a:t>
+            </a:r>
+            <a:endParaRPr lang="en-US" altLang="ko-KR" sz="2400" dirty="0">
               <a:latin typeface="나눔스퀘어_ac" panose="020B0600000101010101" pitchFamily="50" charset="-127"/>
               <a:ea typeface="나눔스퀘어_ac" panose="020B0600000101010101" pitchFamily="50" charset="-127"/>
             </a:endParaRPr>
@@ -6363,53 +6810,53 @@
           <a:p>
             <a:pPr algn="r"/>
             <a:r>
-              <a:rPr lang="en-US" altLang="ko-KR" sz="2400">
+              <a:rPr lang="en-US" altLang="ko-KR" sz="2400" dirty="0">
                 <a:latin typeface="나눔스퀘어_ac" panose="020B0600000101010101" pitchFamily="50" charset="-127"/>
                 <a:ea typeface="나눔스퀘어_ac" panose="020B0600000101010101" pitchFamily="50" charset="-127"/>
               </a:rPr>
               <a:t>× </a:t>
             </a:r>
             <a:r>
-              <a:rPr lang="ko-KR" altLang="en-US" sz="2400">
+              <a:rPr lang="ko-KR" altLang="en-US" sz="2400" dirty="0">
                 <a:latin typeface="나눔스퀘어_ac" panose="020B0600000101010101" pitchFamily="50" charset="-127"/>
                 <a:ea typeface="나눔스퀘어_ac" panose="020B0600000101010101" pitchFamily="50" charset="-127"/>
               </a:rPr>
               <a:t>강남구 유동인구 중 </a:t>
             </a:r>
             <a:r>
-              <a:rPr lang="en-US" altLang="ko-KR" sz="2400">
+              <a:rPr lang="en-US" altLang="ko-KR" sz="2400" dirty="0">
                 <a:latin typeface="나눔스퀘어_ac" panose="020B0600000101010101" pitchFamily="50" charset="-127"/>
                 <a:ea typeface="나눔스퀘어_ac" panose="020B0600000101010101" pitchFamily="50" charset="-127"/>
               </a:rPr>
               <a:t>20</a:t>
             </a:r>
             <a:r>
-              <a:rPr lang="ko-KR" altLang="en-US" sz="2400">
+              <a:rPr lang="ko-KR" altLang="en-US" sz="2400" dirty="0">
                 <a:latin typeface="나눔스퀘어_ac" panose="020B0600000101010101" pitchFamily="50" charset="-127"/>
                 <a:ea typeface="나눔스퀘어_ac" panose="020B0600000101010101" pitchFamily="50" charset="-127"/>
               </a:rPr>
               <a:t>대 남성 비율</a:t>
             </a:r>
-            <a:endParaRPr lang="ko-KR" altLang="en-US" sz="2400"/>
+            <a:endParaRPr lang="ko-KR" altLang="en-US" sz="2400" dirty="0"/>
           </a:p>
           <a:p>
             <a:pPr algn="r"/>
             <a:r>
-              <a:rPr lang="en-US" altLang="ko-KR" sz="1600">
+              <a:rPr lang="en-US" altLang="ko-KR" sz="1600" dirty="0">
                 <a:latin typeface="나눔스퀘어_ac" panose="020B0600000101010101" pitchFamily="50" charset="-127"/>
                 <a:ea typeface="나눔스퀘어_ac" panose="020B0600000101010101" pitchFamily="50" charset="-127"/>
               </a:rPr>
               <a:t>(+</a:t>
             </a:r>
             <a:r>
-              <a:rPr lang="ko-KR" altLang="en-US" sz="1600">
+              <a:rPr lang="ko-KR" altLang="en-US" sz="1600" dirty="0">
                 <a:latin typeface="나눔스퀘어_ac" panose="020B0600000101010101" pitchFamily="50" charset="-127"/>
                 <a:ea typeface="나눔스퀘어_ac" panose="020B0600000101010101" pitchFamily="50" charset="-127"/>
               </a:rPr>
               <a:t>정규화 프로세스</a:t>
             </a:r>
             <a:r>
-              <a:rPr lang="en-US" altLang="ko-KR" sz="1600">
+              <a:rPr lang="en-US" altLang="ko-KR" sz="1600" dirty="0">
                 <a:latin typeface="나눔스퀘어_ac" panose="020B0600000101010101" pitchFamily="50" charset="-127"/>
                 <a:ea typeface="나눔스퀘어_ac" panose="020B0600000101010101" pitchFamily="50" charset="-127"/>
               </a:rPr>
@@ -7537,7 +7984,10 @@
           <a:lstStyle/>
           <a:p>
             <a:pPr algn="ctr"/>
-            <a:endParaRPr lang="ko-KR" altLang="en-US"/>
+            <a:endParaRPr lang="ko-KR" altLang="en-US">
+              <a:latin typeface="나눔스퀘어_ac ExtraBold" panose="020B0600000101010101" pitchFamily="50" charset="-127"/>
+              <a:ea typeface="나눔스퀘어_ac ExtraBold" panose="020B0600000101010101" pitchFamily="50" charset="-127"/>
+            </a:endParaRPr>
           </a:p>
         </p:txBody>
       </p:sp>
@@ -7943,58 +8393,20 @@
       </p:sp>
       <p:sp>
         <p:nvSpPr>
-          <p:cNvPr id="20" name="TextBox 19">
-            <a:extLst>
-              <a:ext uri="{FF2B5EF4-FFF2-40B4-BE49-F238E27FC236}">
-                <a16:creationId xmlns:a16="http://schemas.microsoft.com/office/drawing/2014/main" id="{69DB906E-C18B-44A2-B854-52151B7121B9}"/>
-              </a:ext>
-            </a:extLst>
-          </p:cNvPr>
-          <p:cNvSpPr txBox="1"/>
+          <p:cNvPr id="21" name="평행 사변형 20">
+            <a:extLst>
+              <a:ext uri="{FF2B5EF4-FFF2-40B4-BE49-F238E27FC236}">
+                <a16:creationId xmlns:a16="http://schemas.microsoft.com/office/drawing/2014/main" id="{81C00288-DBF3-4FC3-B180-7491BDC5DF07}"/>
+              </a:ext>
+            </a:extLst>
+          </p:cNvPr>
+          <p:cNvSpPr/>
           <p:nvPr/>
         </p:nvSpPr>
         <p:spPr>
           <a:xfrm>
-            <a:off x="622923" y="478556"/>
-            <a:ext cx="979755" cy="646331"/>
-          </a:xfrm>
-          <a:prstGeom prst="rect">
-            <a:avLst/>
-          </a:prstGeom>
-          <a:noFill/>
-        </p:spPr>
-        <p:txBody>
-          <a:bodyPr wrap="none" rtlCol="0">
-            <a:spAutoFit/>
-          </a:bodyPr>
-          <a:lstStyle/>
-          <a:p>
-            <a:r>
-              <a:rPr lang="ko-KR" altLang="en-US" sz="3600">
-                <a:latin typeface="나눔스퀘어_ac Bold" panose="020B0600000101010101" pitchFamily="50" charset="-127"/>
-                <a:ea typeface="나눔스퀘어_ac Bold" panose="020B0600000101010101" pitchFamily="50" charset="-127"/>
-              </a:rPr>
-              <a:t>주제</a:t>
-            </a:r>
-          </a:p>
-        </p:txBody>
-      </p:sp>
-      <p:sp>
-        <p:nvSpPr>
-          <p:cNvPr id="21" name="평행 사변형 20">
-            <a:extLst>
-              <a:ext uri="{FF2B5EF4-FFF2-40B4-BE49-F238E27FC236}">
-                <a16:creationId xmlns:a16="http://schemas.microsoft.com/office/drawing/2014/main" id="{81C00288-DBF3-4FC3-B180-7491BDC5DF07}"/>
-              </a:ext>
-            </a:extLst>
-          </p:cNvPr>
-          <p:cNvSpPr/>
-          <p:nvPr/>
-        </p:nvSpPr>
-        <p:spPr>
-          <a:xfrm>
-            <a:off x="2102865" y="1402456"/>
-            <a:ext cx="2234301" cy="216000"/>
+            <a:off x="1988540" y="1431410"/>
+            <a:ext cx="2504681" cy="210406"/>
           </a:xfrm>
           <a:prstGeom prst="parallelogram">
             <a:avLst/>
@@ -8027,7 +8439,10 @@
           <a:lstStyle/>
           <a:p>
             <a:pPr algn="ctr"/>
-            <a:endParaRPr lang="ko-KR" altLang="en-US" sz="2400"/>
+            <a:endParaRPr lang="ko-KR" altLang="en-US" sz="2400">
+              <a:latin typeface="나눔스퀘어_ac ExtraBold" panose="020B0600000101010101" pitchFamily="50" charset="-127"/>
+              <a:ea typeface="나눔스퀘어_ac ExtraBold" panose="020B0600000101010101" pitchFamily="50" charset="-127"/>
+            </a:endParaRPr>
           </a:p>
         </p:txBody>
       </p:sp>
@@ -8079,7 +8494,10 @@
           <a:lstStyle/>
           <a:p>
             <a:pPr algn="ctr"/>
-            <a:endParaRPr lang="ko-KR" altLang="en-US" sz="2400"/>
+            <a:endParaRPr lang="ko-KR" altLang="en-US" sz="2400">
+              <a:latin typeface="나눔스퀘어_ac ExtraBold" panose="020B0600000101010101" pitchFamily="50" charset="-127"/>
+              <a:ea typeface="나눔스퀘어_ac ExtraBold" panose="020B0600000101010101" pitchFamily="50" charset="-127"/>
+            </a:endParaRPr>
           </a:p>
         </p:txBody>
       </p:sp>
@@ -8131,7 +8549,10 @@
           <a:lstStyle/>
           <a:p>
             <a:pPr algn="ctr"/>
-            <a:endParaRPr lang="ko-KR" altLang="en-US" sz="2400"/>
+            <a:endParaRPr lang="ko-KR" altLang="en-US" sz="2400">
+              <a:latin typeface="나눔스퀘어_ac ExtraBold" panose="020B0600000101010101" pitchFamily="50" charset="-127"/>
+              <a:ea typeface="나눔스퀘어_ac ExtraBold" panose="020B0600000101010101" pitchFamily="50" charset="-127"/>
+            </a:endParaRPr>
           </a:p>
         </p:txBody>
       </p:sp>
@@ -8165,63 +8586,63 @@
           <a:p>
             <a:r>
               <a:rPr lang="ko-KR" altLang="en-US" sz="3200">
-                <a:latin typeface="나눔스퀘어_ac" panose="020B0600000101010101" pitchFamily="50" charset="-127"/>
-                <a:ea typeface="나눔스퀘어_ac" panose="020B0600000101010101" pitchFamily="50" charset="-127"/>
+                <a:latin typeface="나눔스퀘어_ac ExtraBold" panose="020B0600000101010101" pitchFamily="50" charset="-127"/>
+                <a:ea typeface="나눔스퀘어_ac ExtraBold" panose="020B0600000101010101" pitchFamily="50" charset="-127"/>
               </a:rPr>
               <a:t>지하철</a:t>
             </a:r>
             <a:r>
               <a:rPr lang="en-US" altLang="ko-KR" sz="3200">
-                <a:latin typeface="나눔스퀘어_ac" panose="020B0600000101010101" pitchFamily="50" charset="-127"/>
-                <a:ea typeface="나눔스퀘어_ac" panose="020B0600000101010101" pitchFamily="50" charset="-127"/>
+                <a:latin typeface="나눔스퀘어_ac ExtraBold" panose="020B0600000101010101" pitchFamily="50" charset="-127"/>
+                <a:ea typeface="나눔스퀘어_ac ExtraBold" panose="020B0600000101010101" pitchFamily="50" charset="-127"/>
               </a:rPr>
               <a:t> </a:t>
             </a:r>
             <a:r>
               <a:rPr lang="ko-KR" altLang="en-US" sz="3200">
-                <a:latin typeface="나눔스퀘어_ac" panose="020B0600000101010101" pitchFamily="50" charset="-127"/>
-                <a:ea typeface="나눔스퀘어_ac" panose="020B0600000101010101" pitchFamily="50" charset="-127"/>
+                <a:latin typeface="나눔스퀘어_ac ExtraBold" panose="020B0600000101010101" pitchFamily="50" charset="-127"/>
+                <a:ea typeface="나눔스퀘어_ac ExtraBold" panose="020B0600000101010101" pitchFamily="50" charset="-127"/>
               </a:rPr>
               <a:t>승하차인원 데이터</a:t>
             </a:r>
             <a:r>
               <a:rPr lang="ko-KR" altLang="en-US" sz="2400">
-                <a:latin typeface="나눔스퀘어_ac" panose="020B0600000101010101" pitchFamily="50" charset="-127"/>
-                <a:ea typeface="나눔스퀘어_ac" panose="020B0600000101010101" pitchFamily="50" charset="-127"/>
+                <a:latin typeface="나눔스퀘어_ac ExtraBold" panose="020B0600000101010101" pitchFamily="50" charset="-127"/>
+                <a:ea typeface="나눔스퀘어_ac ExtraBold" panose="020B0600000101010101" pitchFamily="50" charset="-127"/>
               </a:rPr>
               <a:t>   및   </a:t>
             </a:r>
             <a:r>
               <a:rPr lang="ko-KR" altLang="en-US" sz="3200">
-                <a:latin typeface="나눔스퀘어_ac" panose="020B0600000101010101" pitchFamily="50" charset="-127"/>
-                <a:ea typeface="나눔스퀘어_ac" panose="020B0600000101010101" pitchFamily="50" charset="-127"/>
+                <a:latin typeface="나눔스퀘어_ac ExtraBold" panose="020B0600000101010101" pitchFamily="50" charset="-127"/>
+                <a:ea typeface="나눔스퀘어_ac ExtraBold" panose="020B0600000101010101" pitchFamily="50" charset="-127"/>
               </a:rPr>
               <a:t>유동인구 데이터</a:t>
             </a:r>
             <a:r>
               <a:rPr lang="ko-KR" altLang="en-US" sz="2000">
-                <a:latin typeface="나눔스퀘어_ac" panose="020B0600000101010101" pitchFamily="50" charset="-127"/>
-                <a:ea typeface="나눔스퀘어_ac" panose="020B0600000101010101" pitchFamily="50" charset="-127"/>
+                <a:latin typeface="나눔스퀘어_ac ExtraBold" panose="020B0600000101010101" pitchFamily="50" charset="-127"/>
+                <a:ea typeface="나눔스퀘어_ac ExtraBold" panose="020B0600000101010101" pitchFamily="50" charset="-127"/>
               </a:rPr>
               <a:t> </a:t>
             </a:r>
             <a:r>
               <a:rPr lang="ko-KR" altLang="en-US" sz="2400">
-                <a:latin typeface="나눔스퀘어_ac" panose="020B0600000101010101" pitchFamily="50" charset="-127"/>
-                <a:ea typeface="나눔스퀘어_ac" panose="020B0600000101010101" pitchFamily="50" charset="-127"/>
+                <a:latin typeface="나눔스퀘어_ac ExtraBold" panose="020B0600000101010101" pitchFamily="50" charset="-127"/>
+                <a:ea typeface="나눔스퀘어_ac ExtraBold" panose="020B0600000101010101" pitchFamily="50" charset="-127"/>
               </a:rPr>
               <a:t>로부터</a:t>
             </a:r>
             <a:r>
               <a:rPr lang="ko-KR" altLang="en-US" sz="3200">
-                <a:latin typeface="나눔스퀘어_ac" panose="020B0600000101010101" pitchFamily="50" charset="-127"/>
-                <a:ea typeface="나눔스퀘어_ac" panose="020B0600000101010101" pitchFamily="50" charset="-127"/>
+                <a:latin typeface="나눔스퀘어_ac ExtraBold" panose="020B0600000101010101" pitchFamily="50" charset="-127"/>
+                <a:ea typeface="나눔스퀘어_ac ExtraBold" panose="020B0600000101010101" pitchFamily="50" charset="-127"/>
               </a:rPr>
               <a:t>  </a:t>
             </a:r>
             <a:endParaRPr lang="en-US" altLang="ko-KR" sz="3200">
-              <a:latin typeface="나눔스퀘어_ac" panose="020B0600000101010101" pitchFamily="50" charset="-127"/>
-              <a:ea typeface="나눔스퀘어_ac" panose="020B0600000101010101" pitchFamily="50" charset="-127"/>
+              <a:latin typeface="나눔스퀘어_ac ExtraBold" panose="020B0600000101010101" pitchFamily="50" charset="-127"/>
+              <a:ea typeface="나눔스퀘어_ac ExtraBold" panose="020B0600000101010101" pitchFamily="50" charset="-127"/>
             </a:endParaRPr>
           </a:p>
         </p:txBody>
@@ -8240,7 +8661,7 @@
         </p:nvSpPr>
         <p:spPr>
           <a:xfrm>
-            <a:off x="2084935" y="1095004"/>
+            <a:off x="1869141" y="1092004"/>
             <a:ext cx="3209363" cy="584775"/>
           </a:xfrm>
           <a:prstGeom prst="rect">
@@ -8256,22 +8677,11 @@
           <a:p>
             <a:r>
               <a:rPr lang="ko-KR" altLang="en-US" sz="3200" dirty="0">
-                <a:latin typeface="나눔스퀘어_ac" panose="020B0600000101010101" pitchFamily="50" charset="-127"/>
-                <a:ea typeface="나눔스퀘어_ac" panose="020B0600000101010101" pitchFamily="50" charset="-127"/>
-              </a:rPr>
-              <a:t>광고효과지수 </a:t>
-            </a:r>
-            <a:r>
-              <a:rPr lang="ko-KR" altLang="en-US" sz="2400" dirty="0">
-                <a:latin typeface="나눔스퀘어_ac" panose="020B0600000101010101" pitchFamily="50" charset="-127"/>
-                <a:ea typeface="나눔스퀘어_ac" panose="020B0600000101010101" pitchFamily="50" charset="-127"/>
-              </a:rPr>
-              <a:t>도출</a:t>
-            </a:r>
-            <a:endParaRPr lang="ko-KR" altLang="en-US" sz="3200" dirty="0">
-              <a:latin typeface="나눔스퀘어_ac" panose="020B0600000101010101" pitchFamily="50" charset="-127"/>
-              <a:ea typeface="나눔스퀘어_ac" panose="020B0600000101010101" pitchFamily="50" charset="-127"/>
-            </a:endParaRPr>
+                <a:latin typeface="나눔스퀘어_ac ExtraBold" panose="020B0600000101010101" pitchFamily="50" charset="-127"/>
+                <a:ea typeface="나눔스퀘어_ac ExtraBold" panose="020B0600000101010101" pitchFamily="50" charset="-127"/>
+              </a:rPr>
+              <a:t> 광고 전략 도출</a:t>
+            </a:r>
           </a:p>
         </p:txBody>
       </p:sp>
@@ -9431,6 +9841,61 @@
       </p:grpSpPr>
       <p:sp>
         <p:nvSpPr>
+          <p:cNvPr id="19" name="평행 사변형 18">
+            <a:extLst>
+              <a:ext uri="{FF2B5EF4-FFF2-40B4-BE49-F238E27FC236}">
+                <a16:creationId xmlns:a16="http://schemas.microsoft.com/office/drawing/2014/main" id="{91688927-9CEE-408C-8B56-9810779A60F9}"/>
+              </a:ext>
+            </a:extLst>
+          </p:cNvPr>
+          <p:cNvSpPr/>
+          <p:nvPr/>
+        </p:nvSpPr>
+        <p:spPr>
+          <a:xfrm>
+            <a:off x="3280528" y="3687122"/>
+            <a:ext cx="1571524" cy="175176"/>
+          </a:xfrm>
+          <a:prstGeom prst="parallelogram">
+            <a:avLst/>
+          </a:prstGeom>
+          <a:solidFill>
+            <a:srgbClr val="E2C9C0"/>
+          </a:solidFill>
+          <a:ln>
+            <a:noFill/>
+          </a:ln>
+        </p:spPr>
+        <p:style>
+          <a:lnRef idx="2">
+            <a:schemeClr val="accent1">
+              <a:shade val="50000"/>
+            </a:schemeClr>
+          </a:lnRef>
+          <a:fillRef idx="1">
+            <a:schemeClr val="accent1"/>
+          </a:fillRef>
+          <a:effectRef idx="0">
+            <a:schemeClr val="accent1"/>
+          </a:effectRef>
+          <a:fontRef idx="minor">
+            <a:schemeClr val="lt1"/>
+          </a:fontRef>
+        </p:style>
+        <p:txBody>
+          <a:bodyPr rtlCol="0" anchor="ctr"/>
+          <a:lstStyle/>
+          <a:p>
+            <a:pPr algn="ctr"/>
+            <a:endParaRPr lang="ko-KR" altLang="en-US" sz="2400">
+              <a:latin typeface="나눔스퀘어_ac ExtraBold" panose="020B0600000101010101" pitchFamily="50" charset="-127"/>
+              <a:ea typeface="나눔스퀘어_ac ExtraBold" panose="020B0600000101010101" pitchFamily="50" charset="-127"/>
+            </a:endParaRPr>
+          </a:p>
+        </p:txBody>
+      </p:sp>
+      <p:sp>
+        <p:nvSpPr>
           <p:cNvPr id="8" name="직사각형 7">
             <a:extLst>
               <a:ext uri="{FF2B5EF4-FFF2-40B4-BE49-F238E27FC236}">
@@ -9973,7 +10438,7 @@
         </p:nvSpPr>
         <p:spPr>
           <a:xfrm>
-            <a:off x="331339" y="1956679"/>
+            <a:off x="57962" y="1982878"/>
             <a:ext cx="2563522" cy="461665"/>
           </a:xfrm>
           <a:prstGeom prst="rect">
@@ -10023,7 +10488,7 @@
         </p:nvSpPr>
         <p:spPr>
           <a:xfrm>
-            <a:off x="469197" y="3277092"/>
+            <a:off x="59565" y="3278009"/>
             <a:ext cx="2287806" cy="461665"/>
           </a:xfrm>
           <a:prstGeom prst="rect">
@@ -10073,7 +10538,7 @@
         </p:nvSpPr>
         <p:spPr>
           <a:xfrm>
-            <a:off x="467594" y="4661632"/>
+            <a:off x="57962" y="4662549"/>
             <a:ext cx="2291012" cy="461665"/>
           </a:xfrm>
           <a:prstGeom prst="rect">
@@ -10105,6 +10570,925 @@
             <a:endParaRPr lang="ko-KR" altLang="en-US" sz="2400" dirty="0">
               <a:latin typeface="나눔스퀘어_ac Light" panose="020B0600000101010101" pitchFamily="50" charset="-127"/>
               <a:ea typeface="나눔스퀘어_ac Light" panose="020B0600000101010101" pitchFamily="50" charset="-127"/>
+            </a:endParaRPr>
+          </a:p>
+        </p:txBody>
+      </p:sp>
+      <p:graphicFrame>
+        <p:nvGraphicFramePr>
+          <p:cNvPr id="5" name="표 6">
+            <a:extLst>
+              <a:ext uri="{FF2B5EF4-FFF2-40B4-BE49-F238E27FC236}">
+                <a16:creationId xmlns:a16="http://schemas.microsoft.com/office/drawing/2014/main" id="{AB605DCC-A591-437B-8525-A352ACFEED62}"/>
+              </a:ext>
+            </a:extLst>
+          </p:cNvPr>
+          <p:cNvGraphicFramePr>
+            <a:graphicFrameLocks noGrp="1"/>
+          </p:cNvGraphicFramePr>
+          <p:nvPr>
+            <p:extLst>
+              <p:ext uri="{D42A27DB-BD31-4B8C-83A1-F6EECF244321}">
+                <p14:modId xmlns:p14="http://schemas.microsoft.com/office/powerpoint/2010/main" val="60892455"/>
+              </p:ext>
+            </p:extLst>
+          </p:nvPr>
+        </p:nvGraphicFramePr>
+        <p:xfrm>
+          <a:off x="2894861" y="1659661"/>
+          <a:ext cx="9093684" cy="1112520"/>
+        </p:xfrm>
+        <a:graphic>
+          <a:graphicData uri="http://schemas.openxmlformats.org/drawingml/2006/table">
+            <a:tbl>
+              <a:tblPr firstRow="1" bandRow="1">
+                <a:tableStyleId>{5C22544A-7EE6-4342-B048-85BDC9FD1C3A}</a:tableStyleId>
+              </a:tblPr>
+              <a:tblGrid>
+                <a:gridCol w="757807">
+                  <a:extLst>
+                    <a:ext uri="{9D8B030D-6E8A-4147-A177-3AD203B41FA5}">
+                      <a16:colId xmlns:a16="http://schemas.microsoft.com/office/drawing/2014/main" val="810004794"/>
+                    </a:ext>
+                  </a:extLst>
+                </a:gridCol>
+                <a:gridCol w="757807">
+                  <a:extLst>
+                    <a:ext uri="{9D8B030D-6E8A-4147-A177-3AD203B41FA5}">
+                      <a16:colId xmlns:a16="http://schemas.microsoft.com/office/drawing/2014/main" val="1020093713"/>
+                    </a:ext>
+                  </a:extLst>
+                </a:gridCol>
+                <a:gridCol w="757807">
+                  <a:extLst>
+                    <a:ext uri="{9D8B030D-6E8A-4147-A177-3AD203B41FA5}">
+                      <a16:colId xmlns:a16="http://schemas.microsoft.com/office/drawing/2014/main" val="206595045"/>
+                    </a:ext>
+                  </a:extLst>
+                </a:gridCol>
+                <a:gridCol w="757807">
+                  <a:extLst>
+                    <a:ext uri="{9D8B030D-6E8A-4147-A177-3AD203B41FA5}">
+                      <a16:colId xmlns:a16="http://schemas.microsoft.com/office/drawing/2014/main" val="3343072995"/>
+                    </a:ext>
+                  </a:extLst>
+                </a:gridCol>
+                <a:gridCol w="757807">
+                  <a:extLst>
+                    <a:ext uri="{9D8B030D-6E8A-4147-A177-3AD203B41FA5}">
+                      <a16:colId xmlns:a16="http://schemas.microsoft.com/office/drawing/2014/main" val="2727979300"/>
+                    </a:ext>
+                  </a:extLst>
+                </a:gridCol>
+                <a:gridCol w="757807">
+                  <a:extLst>
+                    <a:ext uri="{9D8B030D-6E8A-4147-A177-3AD203B41FA5}">
+                      <a16:colId xmlns:a16="http://schemas.microsoft.com/office/drawing/2014/main" val="3106150630"/>
+                    </a:ext>
+                  </a:extLst>
+                </a:gridCol>
+                <a:gridCol w="757807">
+                  <a:extLst>
+                    <a:ext uri="{9D8B030D-6E8A-4147-A177-3AD203B41FA5}">
+                      <a16:colId xmlns:a16="http://schemas.microsoft.com/office/drawing/2014/main" val="1874190121"/>
+                    </a:ext>
+                  </a:extLst>
+                </a:gridCol>
+                <a:gridCol w="757807">
+                  <a:extLst>
+                    <a:ext uri="{9D8B030D-6E8A-4147-A177-3AD203B41FA5}">
+                      <a16:colId xmlns:a16="http://schemas.microsoft.com/office/drawing/2014/main" val="129161622"/>
+                    </a:ext>
+                  </a:extLst>
+                </a:gridCol>
+                <a:gridCol w="757807">
+                  <a:extLst>
+                    <a:ext uri="{9D8B030D-6E8A-4147-A177-3AD203B41FA5}">
+                      <a16:colId xmlns:a16="http://schemas.microsoft.com/office/drawing/2014/main" val="406540386"/>
+                    </a:ext>
+                  </a:extLst>
+                </a:gridCol>
+                <a:gridCol w="757807">
+                  <a:extLst>
+                    <a:ext uri="{9D8B030D-6E8A-4147-A177-3AD203B41FA5}">
+                      <a16:colId xmlns:a16="http://schemas.microsoft.com/office/drawing/2014/main" val="3361950948"/>
+                    </a:ext>
+                  </a:extLst>
+                </a:gridCol>
+                <a:gridCol w="757807">
+                  <a:extLst>
+                    <a:ext uri="{9D8B030D-6E8A-4147-A177-3AD203B41FA5}">
+                      <a16:colId xmlns:a16="http://schemas.microsoft.com/office/drawing/2014/main" val="1709639786"/>
+                    </a:ext>
+                  </a:extLst>
+                </a:gridCol>
+                <a:gridCol w="757807">
+                  <a:extLst>
+                    <a:ext uri="{9D8B030D-6E8A-4147-A177-3AD203B41FA5}">
+                      <a16:colId xmlns:a16="http://schemas.microsoft.com/office/drawing/2014/main" val="1546652231"/>
+                    </a:ext>
+                  </a:extLst>
+                </a:gridCol>
+              </a:tblGrid>
+              <a:tr h="370840">
+                <a:tc>
+                  <a:txBody>
+                    <a:bodyPr/>
+                    <a:lstStyle/>
+                    <a:p>
+                      <a:pPr latinLnBrk="1"/>
+                      <a:r>
+                        <a:rPr lang="ko-KR" altLang="en-US" sz="1000" dirty="0"/>
+                        <a:t>역</a:t>
+                      </a:r>
+                      <a:r>
+                        <a:rPr lang="en-US" altLang="ko-KR" sz="1000" dirty="0"/>
+                        <a:t>&amp;</a:t>
+                      </a:r>
+                      <a:r>
+                        <a:rPr lang="ko-KR" altLang="en-US" sz="1000" dirty="0"/>
+                        <a:t>시간</a:t>
+                      </a:r>
+                    </a:p>
+                  </a:txBody>
+                  <a:tcPr/>
+                </a:tc>
+                <a:tc>
+                  <a:txBody>
+                    <a:bodyPr/>
+                    <a:lstStyle/>
+                    <a:p>
+                      <a:pPr latinLnBrk="1"/>
+                      <a:r>
+                        <a:rPr lang="en-US" altLang="ko-KR" sz="1000" dirty="0"/>
+                        <a:t>20</a:t>
+                      </a:r>
+                      <a:r>
+                        <a:rPr lang="ko-KR" altLang="en-US" sz="1000" dirty="0"/>
+                        <a:t> 남</a:t>
+                      </a:r>
+                    </a:p>
+                  </a:txBody>
+                  <a:tcPr/>
+                </a:tc>
+                <a:tc>
+                  <a:txBody>
+                    <a:bodyPr/>
+                    <a:lstStyle/>
+                    <a:p>
+                      <a:pPr latinLnBrk="1"/>
+                      <a:r>
+                        <a:rPr lang="en-US" altLang="ko-KR" sz="1000" dirty="0"/>
+                        <a:t>20</a:t>
+                      </a:r>
+                      <a:r>
+                        <a:rPr lang="ko-KR" altLang="en-US" sz="1000" dirty="0"/>
+                        <a:t> 여</a:t>
+                      </a:r>
+                    </a:p>
+                  </a:txBody>
+                  <a:tcPr/>
+                </a:tc>
+                <a:tc>
+                  <a:txBody>
+                    <a:bodyPr/>
+                    <a:lstStyle/>
+                    <a:p>
+                      <a:pPr latinLnBrk="1"/>
+                      <a:r>
+                        <a:rPr lang="en-US" altLang="ko-KR" sz="1000" dirty="0"/>
+                        <a:t>30</a:t>
+                      </a:r>
+                      <a:r>
+                        <a:rPr lang="ko-KR" altLang="en-US" sz="1000" dirty="0"/>
+                        <a:t> 남</a:t>
+                      </a:r>
+                    </a:p>
+                  </a:txBody>
+                  <a:tcPr/>
+                </a:tc>
+                <a:tc>
+                  <a:txBody>
+                    <a:bodyPr/>
+                    <a:lstStyle/>
+                    <a:p>
+                      <a:pPr latinLnBrk="1"/>
+                      <a:r>
+                        <a:rPr lang="en-US" altLang="ko-KR" sz="1000" dirty="0"/>
+                        <a:t>30</a:t>
+                      </a:r>
+                      <a:r>
+                        <a:rPr lang="ko-KR" altLang="en-US" sz="1000" dirty="0"/>
+                        <a:t> 여</a:t>
+                      </a:r>
+                    </a:p>
+                  </a:txBody>
+                  <a:tcPr/>
+                </a:tc>
+                <a:tc>
+                  <a:txBody>
+                    <a:bodyPr/>
+                    <a:lstStyle/>
+                    <a:p>
+                      <a:pPr latinLnBrk="1"/>
+                      <a:r>
+                        <a:rPr lang="en-US" altLang="ko-KR" sz="1000" dirty="0"/>
+                        <a:t>40</a:t>
+                      </a:r>
+                      <a:r>
+                        <a:rPr lang="ko-KR" altLang="en-US" sz="1000" dirty="0"/>
+                        <a:t> 남</a:t>
+                      </a:r>
+                    </a:p>
+                  </a:txBody>
+                  <a:tcPr/>
+                </a:tc>
+                <a:tc>
+                  <a:txBody>
+                    <a:bodyPr/>
+                    <a:lstStyle/>
+                    <a:p>
+                      <a:pPr latinLnBrk="1"/>
+                      <a:r>
+                        <a:rPr lang="en-US" altLang="ko-KR" sz="1000" dirty="0"/>
+                        <a:t>40</a:t>
+                      </a:r>
+                      <a:r>
+                        <a:rPr lang="ko-KR" altLang="en-US" sz="1000" dirty="0"/>
+                        <a:t> 여</a:t>
+                      </a:r>
+                    </a:p>
+                  </a:txBody>
+                  <a:tcPr/>
+                </a:tc>
+                <a:tc>
+                  <a:txBody>
+                    <a:bodyPr/>
+                    <a:lstStyle/>
+                    <a:p>
+                      <a:pPr latinLnBrk="1"/>
+                      <a:r>
+                        <a:rPr lang="en-US" altLang="ko-KR" sz="1000" dirty="0"/>
+                        <a:t>50 </a:t>
+                      </a:r>
+                      <a:r>
+                        <a:rPr lang="ko-KR" altLang="en-US" sz="1000" dirty="0"/>
+                        <a:t>남</a:t>
+                      </a:r>
+                    </a:p>
+                  </a:txBody>
+                  <a:tcPr/>
+                </a:tc>
+                <a:tc>
+                  <a:txBody>
+                    <a:bodyPr/>
+                    <a:lstStyle/>
+                    <a:p>
+                      <a:pPr latinLnBrk="1"/>
+                      <a:r>
+                        <a:rPr lang="en-US" altLang="ko-KR" sz="1000" dirty="0"/>
+                        <a:t>50 </a:t>
+                      </a:r>
+                      <a:r>
+                        <a:rPr lang="ko-KR" altLang="en-US" sz="1000" dirty="0"/>
+                        <a:t>여</a:t>
+                      </a:r>
+                    </a:p>
+                  </a:txBody>
+                  <a:tcPr/>
+                </a:tc>
+                <a:tc>
+                  <a:txBody>
+                    <a:bodyPr/>
+                    <a:lstStyle/>
+                    <a:p>
+                      <a:pPr latinLnBrk="1"/>
+                      <a:r>
+                        <a:rPr lang="en-US" altLang="ko-KR" sz="1000" dirty="0"/>
+                        <a:t>60-70</a:t>
+                      </a:r>
+                      <a:r>
+                        <a:rPr lang="ko-KR" altLang="en-US" sz="1000" dirty="0"/>
+                        <a:t> 남</a:t>
+                      </a:r>
+                    </a:p>
+                  </a:txBody>
+                  <a:tcPr/>
+                </a:tc>
+                <a:tc>
+                  <a:txBody>
+                    <a:bodyPr/>
+                    <a:lstStyle/>
+                    <a:p>
+                      <a:pPr latinLnBrk="1"/>
+                      <a:r>
+                        <a:rPr lang="en-US" altLang="ko-KR" sz="1000" dirty="0"/>
+                        <a:t>60-70 </a:t>
+                      </a:r>
+                      <a:r>
+                        <a:rPr lang="ko-KR" altLang="en-US" sz="1000" dirty="0"/>
+                        <a:t>여</a:t>
+                      </a:r>
+                    </a:p>
+                  </a:txBody>
+                  <a:tcPr/>
+                </a:tc>
+                <a:tc>
+                  <a:txBody>
+                    <a:bodyPr/>
+                    <a:lstStyle/>
+                    <a:p>
+                      <a:pPr latinLnBrk="1"/>
+                      <a:r>
+                        <a:rPr lang="ko-KR" altLang="en-US" sz="1000" dirty="0"/>
+                        <a:t>전체</a:t>
+                      </a:r>
+                    </a:p>
+                  </a:txBody>
+                  <a:tcPr/>
+                </a:tc>
+                <a:extLst>
+                  <a:ext uri="{0D108BD9-81ED-4DB2-BD59-A6C34878D82A}">
+                    <a16:rowId xmlns:a16="http://schemas.microsoft.com/office/drawing/2014/main" val="1575740520"/>
+                  </a:ext>
+                </a:extLst>
+              </a:tr>
+              <a:tr h="370840">
+                <a:tc>
+                  <a:txBody>
+                    <a:bodyPr/>
+                    <a:lstStyle/>
+                    <a:p>
+                      <a:pPr latinLnBrk="1"/>
+                      <a:r>
+                        <a:rPr lang="ko-KR" altLang="en-US" sz="1000" dirty="0"/>
+                        <a:t>강남 낮</a:t>
+                      </a:r>
+                    </a:p>
+                  </a:txBody>
+                  <a:tcPr/>
+                </a:tc>
+                <a:tc>
+                  <a:txBody>
+                    <a:bodyPr/>
+                    <a:lstStyle/>
+                    <a:p>
+                      <a:pPr algn="r" fontAlgn="ctr"/>
+                      <a:r>
+                        <a:rPr lang="en-US" altLang="ko-KR" sz="1000" dirty="0">
+                          <a:effectLst/>
+                        </a:rPr>
+                        <a:t>54764</a:t>
+                      </a:r>
+                    </a:p>
+                  </a:txBody>
+                  <a:tcPr anchor="ctr"/>
+                </a:tc>
+                <a:tc>
+                  <a:txBody>
+                    <a:bodyPr/>
+                    <a:lstStyle/>
+                    <a:p>
+                      <a:pPr algn="r" fontAlgn="ctr"/>
+                      <a:r>
+                        <a:rPr lang="en-US" altLang="ko-KR" sz="1000" dirty="0">
+                          <a:effectLst/>
+                        </a:rPr>
+                        <a:t>86566</a:t>
+                      </a:r>
+                    </a:p>
+                  </a:txBody>
+                  <a:tcPr anchor="ctr"/>
+                </a:tc>
+                <a:tc>
+                  <a:txBody>
+                    <a:bodyPr/>
+                    <a:lstStyle/>
+                    <a:p>
+                      <a:pPr algn="r" fontAlgn="ctr"/>
+                      <a:r>
+                        <a:rPr lang="en-US" altLang="ko-KR" sz="1000" dirty="0">
+                          <a:effectLst/>
+                        </a:rPr>
+                        <a:t>78866</a:t>
+                      </a:r>
+                    </a:p>
+                  </a:txBody>
+                  <a:tcPr anchor="ctr"/>
+                </a:tc>
+                <a:tc>
+                  <a:txBody>
+                    <a:bodyPr/>
+                    <a:lstStyle/>
+                    <a:p>
+                      <a:pPr algn="r" fontAlgn="ctr"/>
+                      <a:r>
+                        <a:rPr lang="en-US" altLang="ko-KR" sz="1000" dirty="0">
+                          <a:effectLst/>
+                        </a:rPr>
+                        <a:t>54829</a:t>
+                      </a:r>
+                    </a:p>
+                  </a:txBody>
+                  <a:tcPr anchor="ctr"/>
+                </a:tc>
+                <a:tc>
+                  <a:txBody>
+                    <a:bodyPr/>
+                    <a:lstStyle/>
+                    <a:p>
+                      <a:pPr algn="r" fontAlgn="ctr"/>
+                      <a:r>
+                        <a:rPr lang="en-US" altLang="ko-KR" sz="1000" dirty="0">
+                          <a:effectLst/>
+                        </a:rPr>
+                        <a:t>45695</a:t>
+                      </a:r>
+                    </a:p>
+                  </a:txBody>
+                  <a:tcPr anchor="ctr"/>
+                </a:tc>
+                <a:tc>
+                  <a:txBody>
+                    <a:bodyPr/>
+                    <a:lstStyle/>
+                    <a:p>
+                      <a:pPr algn="r" fontAlgn="ctr"/>
+                      <a:r>
+                        <a:rPr lang="en-US" altLang="ko-KR" sz="1000" dirty="0">
+                          <a:effectLst/>
+                        </a:rPr>
+                        <a:t>77761</a:t>
+                      </a:r>
+                    </a:p>
+                  </a:txBody>
+                  <a:tcPr anchor="ctr"/>
+                </a:tc>
+                <a:tc>
+                  <a:txBody>
+                    <a:bodyPr/>
+                    <a:lstStyle/>
+                    <a:p>
+                      <a:pPr algn="r" fontAlgn="ctr"/>
+                      <a:r>
+                        <a:rPr lang="en-US" altLang="ko-KR" sz="1000" dirty="0">
+                          <a:effectLst/>
+                        </a:rPr>
+                        <a:t>87016</a:t>
+                      </a:r>
+                    </a:p>
+                  </a:txBody>
+                  <a:tcPr anchor="ctr"/>
+                </a:tc>
+                <a:tc>
+                  <a:txBody>
+                    <a:bodyPr/>
+                    <a:lstStyle/>
+                    <a:p>
+                      <a:pPr algn="r" fontAlgn="ctr"/>
+                      <a:r>
+                        <a:rPr lang="en-US" altLang="ko-KR" sz="1000" dirty="0">
+                          <a:effectLst/>
+                        </a:rPr>
+                        <a:t>68630</a:t>
+                      </a:r>
+                    </a:p>
+                  </a:txBody>
+                  <a:tcPr anchor="ctr"/>
+                </a:tc>
+                <a:tc>
+                  <a:txBody>
+                    <a:bodyPr/>
+                    <a:lstStyle/>
+                    <a:p>
+                      <a:pPr algn="r" fontAlgn="ctr"/>
+                      <a:r>
+                        <a:rPr lang="en-US" altLang="ko-KR" sz="1000" dirty="0">
+                          <a:effectLst/>
+                        </a:rPr>
+                        <a:t>51066</a:t>
+                      </a:r>
+                    </a:p>
+                  </a:txBody>
+                  <a:tcPr anchor="ctr"/>
+                </a:tc>
+                <a:tc>
+                  <a:txBody>
+                    <a:bodyPr/>
+                    <a:lstStyle/>
+                    <a:p>
+                      <a:pPr algn="r" fontAlgn="ctr"/>
+                      <a:r>
+                        <a:rPr lang="en-US" altLang="ko-KR" sz="1000" dirty="0">
+                          <a:effectLst/>
+                        </a:rPr>
+                        <a:t>53625</a:t>
+                      </a:r>
+                    </a:p>
+                  </a:txBody>
+                  <a:tcPr anchor="ctr"/>
+                </a:tc>
+                <a:tc>
+                  <a:txBody>
+                    <a:bodyPr/>
+                    <a:lstStyle/>
+                    <a:p>
+                      <a:pPr algn="r" fontAlgn="ctr"/>
+                      <a:r>
+                        <a:rPr lang="en-US" altLang="ko-KR" sz="1000" dirty="0">
+                          <a:effectLst/>
+                        </a:rPr>
+                        <a:t>658818</a:t>
+                      </a:r>
+                    </a:p>
+                  </a:txBody>
+                  <a:tcPr anchor="ctr"/>
+                </a:tc>
+                <a:extLst>
+                  <a:ext uri="{0D108BD9-81ED-4DB2-BD59-A6C34878D82A}">
+                    <a16:rowId xmlns:a16="http://schemas.microsoft.com/office/drawing/2014/main" val="3175766008"/>
+                  </a:ext>
+                </a:extLst>
+              </a:tr>
+              <a:tr h="370840">
+                <a:tc>
+                  <a:txBody>
+                    <a:bodyPr/>
+                    <a:lstStyle/>
+                    <a:p>
+                      <a:pPr latinLnBrk="1"/>
+                      <a:r>
+                        <a:rPr lang="ko-KR" altLang="en-US" sz="1000" dirty="0"/>
+                        <a:t>잠실 저녁</a:t>
+                      </a:r>
+                    </a:p>
+                  </a:txBody>
+                  <a:tcPr/>
+                </a:tc>
+                <a:tc>
+                  <a:txBody>
+                    <a:bodyPr/>
+                    <a:lstStyle/>
+                    <a:p>
+                      <a:pPr algn="r" fontAlgn="ctr"/>
+                      <a:r>
+                        <a:rPr lang="en-US" altLang="ko-KR" sz="1000" dirty="0">
+                          <a:effectLst/>
+                        </a:rPr>
+                        <a:t>11274</a:t>
+                      </a:r>
+                    </a:p>
+                  </a:txBody>
+                  <a:tcPr anchor="ctr"/>
+                </a:tc>
+                <a:tc>
+                  <a:txBody>
+                    <a:bodyPr/>
+                    <a:lstStyle/>
+                    <a:p>
+                      <a:pPr algn="r" fontAlgn="ctr"/>
+                      <a:r>
+                        <a:rPr lang="en-US" altLang="ko-KR" sz="1000" dirty="0">
+                          <a:effectLst/>
+                        </a:rPr>
+                        <a:t>13795</a:t>
+                      </a:r>
+                    </a:p>
+                  </a:txBody>
+                  <a:tcPr anchor="ctr"/>
+                </a:tc>
+                <a:tc>
+                  <a:txBody>
+                    <a:bodyPr/>
+                    <a:lstStyle/>
+                    <a:p>
+                      <a:pPr algn="r" fontAlgn="ctr"/>
+                      <a:r>
+                        <a:rPr lang="en-US" altLang="ko-KR" sz="1000" dirty="0">
+                          <a:effectLst/>
+                        </a:rPr>
+                        <a:t>13347</a:t>
+                      </a:r>
+                    </a:p>
+                  </a:txBody>
+                  <a:tcPr anchor="ctr"/>
+                </a:tc>
+                <a:tc>
+                  <a:txBody>
+                    <a:bodyPr/>
+                    <a:lstStyle/>
+                    <a:p>
+                      <a:pPr algn="r" fontAlgn="ctr"/>
+                      <a:r>
+                        <a:rPr lang="en-US" altLang="ko-KR" sz="1000" dirty="0">
+                          <a:effectLst/>
+                        </a:rPr>
+                        <a:t>11768</a:t>
+                      </a:r>
+                    </a:p>
+                  </a:txBody>
+                  <a:tcPr anchor="ctr"/>
+                </a:tc>
+                <a:tc>
+                  <a:txBody>
+                    <a:bodyPr/>
+                    <a:lstStyle/>
+                    <a:p>
+                      <a:pPr algn="r" fontAlgn="ctr"/>
+                      <a:r>
+                        <a:rPr lang="en-US" altLang="ko-KR" sz="1000" dirty="0">
+                          <a:effectLst/>
+                        </a:rPr>
+                        <a:t>12003</a:t>
+                      </a:r>
+                    </a:p>
+                  </a:txBody>
+                  <a:tcPr anchor="ctr"/>
+                </a:tc>
+                <a:tc>
+                  <a:txBody>
+                    <a:bodyPr/>
+                    <a:lstStyle/>
+                    <a:p>
+                      <a:pPr algn="r" fontAlgn="ctr"/>
+                      <a:r>
+                        <a:rPr lang="en-US" altLang="ko-KR" sz="1000" dirty="0">
+                          <a:effectLst/>
+                        </a:rPr>
+                        <a:t>11908</a:t>
+                      </a:r>
+                    </a:p>
+                  </a:txBody>
+                  <a:tcPr anchor="ctr"/>
+                </a:tc>
+                <a:tc>
+                  <a:txBody>
+                    <a:bodyPr/>
+                    <a:lstStyle/>
+                    <a:p>
+                      <a:pPr algn="r" fontAlgn="ctr"/>
+                      <a:r>
+                        <a:rPr lang="en-US" altLang="ko-KR" sz="1000" dirty="0">
+                          <a:effectLst/>
+                        </a:rPr>
+                        <a:t>14327</a:t>
+                      </a:r>
+                    </a:p>
+                  </a:txBody>
+                  <a:tcPr anchor="ctr"/>
+                </a:tc>
+                <a:tc>
+                  <a:txBody>
+                    <a:bodyPr/>
+                    <a:lstStyle/>
+                    <a:p>
+                      <a:pPr algn="r" fontAlgn="ctr"/>
+                      <a:r>
+                        <a:rPr lang="en-US" altLang="ko-KR" sz="1000" dirty="0">
+                          <a:effectLst/>
+                        </a:rPr>
+                        <a:t>14301</a:t>
+                      </a:r>
+                    </a:p>
+                  </a:txBody>
+                  <a:tcPr anchor="ctr"/>
+                </a:tc>
+                <a:tc>
+                  <a:txBody>
+                    <a:bodyPr/>
+                    <a:lstStyle/>
+                    <a:p>
+                      <a:pPr algn="r" fontAlgn="ctr"/>
+                      <a:r>
+                        <a:rPr lang="en-US" altLang="ko-KR" sz="1000" dirty="0">
+                          <a:effectLst/>
+                        </a:rPr>
+                        <a:t>13501</a:t>
+                      </a:r>
+                    </a:p>
+                  </a:txBody>
+                  <a:tcPr anchor="ctr"/>
+                </a:tc>
+                <a:tc>
+                  <a:txBody>
+                    <a:bodyPr/>
+                    <a:lstStyle/>
+                    <a:p>
+                      <a:pPr algn="r" fontAlgn="ctr"/>
+                      <a:r>
+                        <a:rPr lang="en-US" altLang="ko-KR" sz="1000" dirty="0">
+                          <a:effectLst/>
+                        </a:rPr>
+                        <a:t>14336</a:t>
+                      </a:r>
+                    </a:p>
+                  </a:txBody>
+                  <a:tcPr anchor="ctr"/>
+                </a:tc>
+                <a:tc>
+                  <a:txBody>
+                    <a:bodyPr/>
+                    <a:lstStyle/>
+                    <a:p>
+                      <a:pPr algn="r" fontAlgn="ctr"/>
+                      <a:r>
+                        <a:rPr lang="en-US" altLang="ko-KR" sz="1000" dirty="0">
+                          <a:effectLst/>
+                        </a:rPr>
+                        <a:t>130560</a:t>
+                      </a:r>
+                    </a:p>
+                  </a:txBody>
+                  <a:tcPr anchor="ctr"/>
+                </a:tc>
+                <a:extLst>
+                  <a:ext uri="{0D108BD9-81ED-4DB2-BD59-A6C34878D82A}">
+                    <a16:rowId xmlns:a16="http://schemas.microsoft.com/office/drawing/2014/main" val="3758422741"/>
+                  </a:ext>
+                </a:extLst>
+              </a:tr>
+            </a:tbl>
+          </a:graphicData>
+        </a:graphic>
+      </p:graphicFrame>
+      <p:sp>
+        <p:nvSpPr>
+          <p:cNvPr id="14" name="TextBox 13">
+            <a:extLst>
+              <a:ext uri="{FF2B5EF4-FFF2-40B4-BE49-F238E27FC236}">
+                <a16:creationId xmlns:a16="http://schemas.microsoft.com/office/drawing/2014/main" id="{B686D762-666D-4E1D-868D-D9C31CC7B4F4}"/>
+              </a:ext>
+            </a:extLst>
+          </p:cNvPr>
+          <p:cNvSpPr txBox="1"/>
+          <p:nvPr/>
+        </p:nvSpPr>
+        <p:spPr>
+          <a:xfrm>
+            <a:off x="3209816" y="3068187"/>
+            <a:ext cx="4557658" cy="830997"/>
+          </a:xfrm>
+          <a:prstGeom prst="rect">
+            <a:avLst/>
+          </a:prstGeom>
+          <a:noFill/>
+        </p:spPr>
+        <p:txBody>
+          <a:bodyPr wrap="none" rtlCol="0">
+            <a:spAutoFit/>
+          </a:bodyPr>
+          <a:lstStyle/>
+          <a:p>
+            <a:r>
+              <a:rPr lang="ko-KR" altLang="en-US" sz="2400" dirty="0">
+                <a:latin typeface="나눔스퀘어_ac Bold" panose="020B0600000101010101" pitchFamily="50" charset="-127"/>
+                <a:ea typeface="나눔스퀘어_ac Bold" panose="020B0600000101010101" pitchFamily="50" charset="-127"/>
+              </a:rPr>
+              <a:t>라벨이 없는 </a:t>
+            </a:r>
+            <a:r>
+              <a:rPr lang="ko-KR" altLang="en-US" sz="2400" dirty="0" err="1">
+                <a:latin typeface="나눔스퀘어_ac Bold" panose="020B0600000101010101" pitchFamily="50" charset="-127"/>
+                <a:ea typeface="나눔스퀘어_ac Bold" panose="020B0600000101010101" pitchFamily="50" charset="-127"/>
+              </a:rPr>
+              <a:t>비지도학습이므로</a:t>
+            </a:r>
+            <a:endParaRPr lang="en-US" altLang="ko-KR" sz="2400" dirty="0">
+              <a:latin typeface="나눔스퀘어_ac Bold" panose="020B0600000101010101" pitchFamily="50" charset="-127"/>
+              <a:ea typeface="나눔스퀘어_ac Bold" panose="020B0600000101010101" pitchFamily="50" charset="-127"/>
+            </a:endParaRPr>
+          </a:p>
+          <a:p>
+            <a:r>
+              <a:rPr lang="en-US" altLang="ko-KR" sz="2400" dirty="0">
+                <a:latin typeface="나눔스퀘어_ac Bold" panose="020B0600000101010101" pitchFamily="50" charset="-127"/>
+                <a:ea typeface="나눔스퀘어_ac Bold" panose="020B0600000101010101" pitchFamily="50" charset="-127"/>
+              </a:rPr>
+              <a:t>Silhouette</a:t>
+            </a:r>
+            <a:r>
+              <a:rPr lang="ko-KR" altLang="en-US" sz="2400" dirty="0">
+                <a:latin typeface="나눔스퀘어_ac Bold" panose="020B0600000101010101" pitchFamily="50" charset="-127"/>
+                <a:ea typeface="나눔스퀘어_ac Bold" panose="020B0600000101010101" pitchFamily="50" charset="-127"/>
+              </a:rPr>
+              <a:t> 비교하여 적절한 </a:t>
+            </a:r>
+            <a:r>
+              <a:rPr lang="en-US" altLang="ko-KR" sz="2400" dirty="0">
+                <a:latin typeface="나눔스퀘어_ac Bold" panose="020B0600000101010101" pitchFamily="50" charset="-127"/>
+                <a:ea typeface="나눔스퀘어_ac Bold" panose="020B0600000101010101" pitchFamily="50" charset="-127"/>
+              </a:rPr>
+              <a:t>K </a:t>
+            </a:r>
+            <a:r>
+              <a:rPr lang="ko-KR" altLang="en-US" sz="2400" dirty="0">
+                <a:latin typeface="나눔스퀘어_ac Bold" panose="020B0600000101010101" pitchFamily="50" charset="-127"/>
+                <a:ea typeface="나눔스퀘어_ac Bold" panose="020B0600000101010101" pitchFamily="50" charset="-127"/>
+              </a:rPr>
+              <a:t>선택</a:t>
+            </a:r>
+            <a:endParaRPr lang="ko-KR" altLang="en-US" sz="2400" dirty="0">
+              <a:latin typeface="나눔스퀘어_ac Light" panose="020B0600000101010101" pitchFamily="50" charset="-127"/>
+              <a:ea typeface="나눔스퀘어_ac Light" panose="020B0600000101010101" pitchFamily="50" charset="-127"/>
+            </a:endParaRPr>
+          </a:p>
+        </p:txBody>
+      </p:sp>
+      <p:sp>
+        <p:nvSpPr>
+          <p:cNvPr id="15" name="TextBox 14">
+            <a:extLst>
+              <a:ext uri="{FF2B5EF4-FFF2-40B4-BE49-F238E27FC236}">
+                <a16:creationId xmlns:a16="http://schemas.microsoft.com/office/drawing/2014/main" id="{F814A071-F2AA-49FE-8FC9-4D66B2ADDE0E}"/>
+              </a:ext>
+            </a:extLst>
+          </p:cNvPr>
+          <p:cNvSpPr txBox="1"/>
+          <p:nvPr/>
+        </p:nvSpPr>
+        <p:spPr>
+          <a:xfrm>
+            <a:off x="3209816" y="4547789"/>
+            <a:ext cx="8138766" cy="1200329"/>
+          </a:xfrm>
+          <a:prstGeom prst="rect">
+            <a:avLst/>
+          </a:prstGeom>
+          <a:noFill/>
+        </p:spPr>
+        <p:txBody>
+          <a:bodyPr wrap="none" rtlCol="0">
+            <a:spAutoFit/>
+          </a:bodyPr>
+          <a:lstStyle/>
+          <a:p>
+            <a:pPr marL="457200" indent="-457200">
+              <a:buAutoNum type="arabicPeriod"/>
+            </a:pPr>
+            <a:r>
+              <a:rPr lang="ko-KR" altLang="en-US" sz="2400" dirty="0">
+                <a:latin typeface="나눔스퀘어_ac Bold" panose="020B0600000101010101" pitchFamily="50" charset="-127"/>
+                <a:ea typeface="나눔스퀘어_ac Bold" panose="020B0600000101010101" pitchFamily="50" charset="-127"/>
+              </a:rPr>
+              <a:t>클러스터 수가 작을수록 전체 유동인구 수만 크게 반영되는 문제</a:t>
+            </a:r>
+            <a:endParaRPr lang="en-US" altLang="ko-KR" sz="2400" dirty="0">
+              <a:latin typeface="나눔스퀘어_ac Bold" panose="020B0600000101010101" pitchFamily="50" charset="-127"/>
+              <a:ea typeface="나눔스퀘어_ac Bold" panose="020B0600000101010101" pitchFamily="50" charset="-127"/>
+            </a:endParaRPr>
+          </a:p>
+          <a:p>
+            <a:pPr marL="457200" indent="-457200">
+              <a:buAutoNum type="arabicPeriod"/>
+            </a:pPr>
+            <a:r>
+              <a:rPr lang="ko-KR" altLang="en-US" sz="2400" dirty="0">
+                <a:latin typeface="나눔스퀘어_ac Bold" panose="020B0600000101010101" pitchFamily="50" charset="-127"/>
+                <a:ea typeface="나눔스퀘어_ac Bold" panose="020B0600000101010101" pitchFamily="50" charset="-127"/>
+              </a:rPr>
+              <a:t>소수 지하철역 유동인구 수가 매우 큼</a:t>
+            </a:r>
+            <a:endParaRPr lang="en-US" altLang="ko-KR" sz="2400" dirty="0">
+              <a:latin typeface="나눔스퀘어_ac Bold" panose="020B0600000101010101" pitchFamily="50" charset="-127"/>
+              <a:ea typeface="나눔스퀘어_ac Bold" panose="020B0600000101010101" pitchFamily="50" charset="-127"/>
+            </a:endParaRPr>
+          </a:p>
+          <a:p>
+            <a:r>
+              <a:rPr lang="en-US" altLang="ko-KR" sz="2400" dirty="0">
+                <a:latin typeface="나눔스퀘어_ac Bold" panose="020B0600000101010101" pitchFamily="50" charset="-127"/>
+                <a:ea typeface="나눔스퀘어_ac Bold" panose="020B0600000101010101" pitchFamily="50" charset="-127"/>
+                <a:sym typeface="Wingdings" panose="05000000000000000000" pitchFamily="2" charset="2"/>
+              </a:rPr>
+              <a:t> </a:t>
+            </a:r>
+            <a:r>
+              <a:rPr lang="ko-KR" altLang="en-US" sz="2400" dirty="0">
+                <a:latin typeface="나눔스퀘어_ac Bold" panose="020B0600000101010101" pitchFamily="50" charset="-127"/>
+                <a:ea typeface="나눔스퀘어_ac Bold" panose="020B0600000101010101" pitchFamily="50" charset="-127"/>
+                <a:sym typeface="Wingdings" panose="05000000000000000000" pitchFamily="2" charset="2"/>
+              </a:rPr>
+              <a:t>클러스터 수 늘리고</a:t>
+            </a:r>
+            <a:r>
+              <a:rPr lang="en-US" altLang="ko-KR" sz="2400" dirty="0">
+                <a:latin typeface="나눔스퀘어_ac Bold" panose="020B0600000101010101" pitchFamily="50" charset="-127"/>
+                <a:ea typeface="나눔스퀘어_ac Bold" panose="020B0600000101010101" pitchFamily="50" charset="-127"/>
+                <a:sym typeface="Wingdings" panose="05000000000000000000" pitchFamily="2" charset="2"/>
+              </a:rPr>
+              <a:t>, </a:t>
+            </a:r>
+            <a:r>
+              <a:rPr lang="ko-KR" altLang="en-US" sz="2400" dirty="0">
+                <a:latin typeface="나눔스퀘어_ac Bold" panose="020B0600000101010101" pitchFamily="50" charset="-127"/>
+                <a:ea typeface="나눔스퀘어_ac Bold" panose="020B0600000101010101" pitchFamily="50" charset="-127"/>
+                <a:sym typeface="Wingdings" panose="05000000000000000000" pitchFamily="2" charset="2"/>
+              </a:rPr>
+              <a:t>연령별 인구비율 분리</a:t>
+            </a:r>
+            <a:endParaRPr lang="en-US" altLang="ko-KR" sz="2400" dirty="0">
+              <a:latin typeface="나눔스퀘어_ac Bold" panose="020B0600000101010101" pitchFamily="50" charset="-127"/>
+              <a:ea typeface="나눔스퀘어_ac Bold" panose="020B0600000101010101" pitchFamily="50" charset="-127"/>
             </a:endParaRPr>
           </a:p>
         </p:txBody>
@@ -10415,4 +11799,299 @@
     </a:ext>
   </a:extLst>
 </a:theme>
+</file>
+
+<file path=ppt/theme/theme2.xml><?xml version="1.0" encoding="utf-8"?>
+<a:theme xmlns:a="http://schemas.openxmlformats.org/drawingml/2006/main" name="Office 테마">
+  <a:themeElements>
+    <a:clrScheme name="Office">
+      <a:dk1>
+        <a:sysClr val="windowText" lastClr="000000"/>
+      </a:dk1>
+      <a:lt1>
+        <a:sysClr val="window" lastClr="FFFFFF"/>
+      </a:lt1>
+      <a:dk2>
+        <a:srgbClr val="44546A"/>
+      </a:dk2>
+      <a:lt2>
+        <a:srgbClr val="E7E6E6"/>
+      </a:lt2>
+      <a:accent1>
+        <a:srgbClr val="4472C4"/>
+      </a:accent1>
+      <a:accent2>
+        <a:srgbClr val="ED7D31"/>
+      </a:accent2>
+      <a:accent3>
+        <a:srgbClr val="A5A5A5"/>
+      </a:accent3>
+      <a:accent4>
+        <a:srgbClr val="FFC000"/>
+      </a:accent4>
+      <a:accent5>
+        <a:srgbClr val="5B9BD5"/>
+      </a:accent5>
+      <a:accent6>
+        <a:srgbClr val="70AD47"/>
+      </a:accent6>
+      <a:hlink>
+        <a:srgbClr val="0563C1"/>
+      </a:hlink>
+      <a:folHlink>
+        <a:srgbClr val="954F72"/>
+      </a:folHlink>
+    </a:clrScheme>
+    <a:fontScheme name="Office">
+      <a:majorFont>
+        <a:latin typeface="맑은 고딕" panose="020F0302020204030204"/>
+        <a:ea typeface=""/>
+        <a:cs typeface=""/>
+        <a:font script="Jpan" typeface="游ゴシック Light"/>
+        <a:font script="Hang" typeface="맑은 고딕"/>
+        <a:font script="Hans" typeface="等线 Light"/>
+        <a:font script="Hant" typeface="新細明體"/>
+        <a:font script="Arab" typeface="Times New Roman"/>
+        <a:font script="Hebr" typeface="Times New Roman"/>
+        <a:font script="Thai" typeface="Angsana New"/>
+        <a:font script="Ethi" typeface="Nyala"/>
+        <a:font script="Beng" typeface="Vrinda"/>
+        <a:font script="Gujr" typeface="Shruti"/>
+        <a:font script="Khmr" typeface="MoolBoran"/>
+        <a:font script="Knda" typeface="Tunga"/>
+        <a:font script="Guru" typeface="Raavi"/>
+        <a:font script="Cans" typeface="Euphemia"/>
+        <a:font script="Cher" typeface="Plantagenet Cherokee"/>
+        <a:font script="Yiii" typeface="Microsoft Yi Baiti"/>
+        <a:font script="Tibt" typeface="Microsoft Himalaya"/>
+        <a:font script="Thaa" typeface="MV Boli"/>
+        <a:font script="Deva" typeface="Mangal"/>
+        <a:font script="Telu" typeface="Gautami"/>
+        <a:font script="Taml" typeface="Latha"/>
+        <a:font script="Syrc" typeface="Estrangelo Edessa"/>
+        <a:font script="Orya" typeface="Kalinga"/>
+        <a:font script="Mlym" typeface="Kartika"/>
+        <a:font script="Laoo" typeface="DokChampa"/>
+        <a:font script="Sinh" typeface="Iskoola Pota"/>
+        <a:font script="Mong" typeface="Mongolian Baiti"/>
+        <a:font script="Viet" typeface="Times New Roman"/>
+        <a:font script="Uigh" typeface="Microsoft Uighur"/>
+        <a:font script="Geor" typeface="Sylfaen"/>
+        <a:font script="Armn" typeface="Arial"/>
+        <a:font script="Bugi" typeface="Leelawadee UI"/>
+        <a:font script="Bopo" typeface="Microsoft JhengHei"/>
+        <a:font script="Java" typeface="Javanese Text"/>
+        <a:font script="Lisu" typeface="Segoe UI"/>
+        <a:font script="Mymr" typeface="Myanmar Text"/>
+        <a:font script="Nkoo" typeface="Ebrima"/>
+        <a:font script="Olck" typeface="Nirmala UI"/>
+        <a:font script="Osma" typeface="Ebrima"/>
+        <a:font script="Phag" typeface="Phagspa"/>
+        <a:font script="Syrn" typeface="Estrangelo Edessa"/>
+        <a:font script="Syrj" typeface="Estrangelo Edessa"/>
+        <a:font script="Syre" typeface="Estrangelo Edessa"/>
+        <a:font script="Sora" typeface="Nirmala UI"/>
+        <a:font script="Tale" typeface="Microsoft Tai Le"/>
+        <a:font script="Talu" typeface="Microsoft New Tai Lue"/>
+        <a:font script="Tfng" typeface="Ebrima"/>
+      </a:majorFont>
+      <a:minorFont>
+        <a:latin typeface="맑은 고딕" panose="020F0502020204030204"/>
+        <a:ea typeface=""/>
+        <a:cs typeface=""/>
+        <a:font script="Jpan" typeface="游ゴシック"/>
+        <a:font script="Hang" typeface="맑은 고딕"/>
+        <a:font script="Hans" typeface="等线"/>
+        <a:font script="Hant" typeface="新細明體"/>
+        <a:font script="Arab" typeface="Arial"/>
+        <a:font script="Hebr" typeface="Arial"/>
+        <a:font script="Thai" typeface="Cordia New"/>
+        <a:font script="Ethi" typeface="Nyala"/>
+        <a:font script="Beng" typeface="Vrinda"/>
+        <a:font script="Gujr" typeface="Shruti"/>
+        <a:font script="Khmr" typeface="DaunPenh"/>
+        <a:font script="Knda" typeface="Tunga"/>
+        <a:font script="Guru" typeface="Raavi"/>
+        <a:font script="Cans" typeface="Euphemia"/>
+        <a:font script="Cher" typeface="Plantagenet Cherokee"/>
+        <a:font script="Yiii" typeface="Microsoft Yi Baiti"/>
+        <a:font script="Tibt" typeface="Microsoft Himalaya"/>
+        <a:font script="Thaa" typeface="MV Boli"/>
+        <a:font script="Deva" typeface="Mangal"/>
+        <a:font script="Telu" typeface="Gautami"/>
+        <a:font script="Taml" typeface="Latha"/>
+        <a:font script="Syrc" typeface="Estrangelo Edessa"/>
+        <a:font script="Orya" typeface="Kalinga"/>
+        <a:font script="Mlym" typeface="Kartika"/>
+        <a:font script="Laoo" typeface="DokChampa"/>
+        <a:font script="Sinh" typeface="Iskoola Pota"/>
+        <a:font script="Mong" typeface="Mongolian Baiti"/>
+        <a:font script="Viet" typeface="Arial"/>
+        <a:font script="Uigh" typeface="Microsoft Uighur"/>
+        <a:font script="Geor" typeface="Sylfaen"/>
+        <a:font script="Armn" typeface="Arial"/>
+        <a:font script="Bugi" typeface="Leelawadee UI"/>
+        <a:font script="Bopo" typeface="Microsoft JhengHei"/>
+        <a:font script="Java" typeface="Javanese Text"/>
+        <a:font script="Lisu" typeface="Segoe UI"/>
+        <a:font script="Mymr" typeface="Myanmar Text"/>
+        <a:font script="Nkoo" typeface="Ebrima"/>
+        <a:font script="Olck" typeface="Nirmala UI"/>
+        <a:font script="Osma" typeface="Ebrima"/>
+        <a:font script="Phag" typeface="Phagspa"/>
+        <a:font script="Syrn" typeface="Estrangelo Edessa"/>
+        <a:font script="Syrj" typeface="Estrangelo Edessa"/>
+        <a:font script="Syre" typeface="Estrangelo Edessa"/>
+        <a:font script="Sora" typeface="Nirmala UI"/>
+        <a:font script="Tale" typeface="Microsoft Tai Le"/>
+        <a:font script="Talu" typeface="Microsoft New Tai Lue"/>
+        <a:font script="Tfng" typeface="Ebrima"/>
+      </a:minorFont>
+    </a:fontScheme>
+    <a:fmtScheme name="Office">
+      <a:fillStyleLst>
+        <a:solidFill>
+          <a:schemeClr val="phClr"/>
+        </a:solidFill>
+        <a:gradFill rotWithShape="1">
+          <a:gsLst>
+            <a:gs pos="0">
+              <a:schemeClr val="phClr">
+                <a:lumMod val="110000"/>
+                <a:satMod val="105000"/>
+                <a:tint val="67000"/>
+              </a:schemeClr>
+            </a:gs>
+            <a:gs pos="50000">
+              <a:schemeClr val="phClr">
+                <a:lumMod val="105000"/>
+                <a:satMod val="103000"/>
+                <a:tint val="73000"/>
+              </a:schemeClr>
+            </a:gs>
+            <a:gs pos="100000">
+              <a:schemeClr val="phClr">
+                <a:lumMod val="105000"/>
+                <a:satMod val="109000"/>
+                <a:tint val="81000"/>
+              </a:schemeClr>
+            </a:gs>
+          </a:gsLst>
+          <a:lin ang="5400000" scaled="0"/>
+        </a:gradFill>
+        <a:gradFill rotWithShape="1">
+          <a:gsLst>
+            <a:gs pos="0">
+              <a:schemeClr val="phClr">
+                <a:satMod val="103000"/>
+                <a:lumMod val="102000"/>
+                <a:tint val="94000"/>
+              </a:schemeClr>
+            </a:gs>
+            <a:gs pos="50000">
+              <a:schemeClr val="phClr">
+                <a:satMod val="110000"/>
+                <a:lumMod val="100000"/>
+                <a:shade val="100000"/>
+              </a:schemeClr>
+            </a:gs>
+            <a:gs pos="100000">
+              <a:schemeClr val="phClr">
+                <a:lumMod val="99000"/>
+                <a:satMod val="120000"/>
+                <a:shade val="78000"/>
+              </a:schemeClr>
+            </a:gs>
+          </a:gsLst>
+          <a:lin ang="5400000" scaled="0"/>
+        </a:gradFill>
+      </a:fillStyleLst>
+      <a:lnStyleLst>
+        <a:ln w="6350" cap="flat" cmpd="sng" algn="ctr">
+          <a:solidFill>
+            <a:schemeClr val="phClr"/>
+          </a:solidFill>
+          <a:prstDash val="solid"/>
+          <a:miter lim="800000"/>
+        </a:ln>
+        <a:ln w="12700" cap="flat" cmpd="sng" algn="ctr">
+          <a:solidFill>
+            <a:schemeClr val="phClr"/>
+          </a:solidFill>
+          <a:prstDash val="solid"/>
+          <a:miter lim="800000"/>
+        </a:ln>
+        <a:ln w="19050" cap="flat" cmpd="sng" algn="ctr">
+          <a:solidFill>
+            <a:schemeClr val="phClr"/>
+          </a:solidFill>
+          <a:prstDash val="solid"/>
+          <a:miter lim="800000"/>
+        </a:ln>
+      </a:lnStyleLst>
+      <a:effectStyleLst>
+        <a:effectStyle>
+          <a:effectLst/>
+        </a:effectStyle>
+        <a:effectStyle>
+          <a:effectLst/>
+        </a:effectStyle>
+        <a:effectStyle>
+          <a:effectLst>
+            <a:outerShdw blurRad="57150" dist="19050" dir="5400000" algn="ctr" rotWithShape="0">
+              <a:srgbClr val="000000">
+                <a:alpha val="63000"/>
+              </a:srgbClr>
+            </a:outerShdw>
+          </a:effectLst>
+        </a:effectStyle>
+      </a:effectStyleLst>
+      <a:bgFillStyleLst>
+        <a:solidFill>
+          <a:schemeClr val="phClr"/>
+        </a:solidFill>
+        <a:solidFill>
+          <a:schemeClr val="phClr">
+            <a:tint val="95000"/>
+            <a:satMod val="170000"/>
+          </a:schemeClr>
+        </a:solidFill>
+        <a:gradFill rotWithShape="1">
+          <a:gsLst>
+            <a:gs pos="0">
+              <a:schemeClr val="phClr">
+                <a:tint val="93000"/>
+                <a:satMod val="150000"/>
+                <a:shade val="98000"/>
+                <a:lumMod val="102000"/>
+              </a:schemeClr>
+            </a:gs>
+            <a:gs pos="50000">
+              <a:schemeClr val="phClr">
+                <a:tint val="98000"/>
+                <a:satMod val="130000"/>
+                <a:shade val="90000"/>
+                <a:lumMod val="103000"/>
+              </a:schemeClr>
+            </a:gs>
+            <a:gs pos="100000">
+              <a:schemeClr val="phClr">
+                <a:shade val="63000"/>
+                <a:satMod val="120000"/>
+              </a:schemeClr>
+            </a:gs>
+          </a:gsLst>
+          <a:lin ang="5400000" scaled="0"/>
+        </a:gradFill>
+      </a:bgFillStyleLst>
+    </a:fmtScheme>
+  </a:themeElements>
+  <a:objectDefaults/>
+  <a:extraClrSchemeLst/>
+  <a:extLst>
+    <a:ext uri="{05A4C25C-085E-4340-85A3-A5531E510DB2}">
+      <thm15:themeFamily xmlns:thm15="http://schemas.microsoft.com/office/thememl/2012/main" name="Office Theme" id="{62F939B6-93AF-4DB8-9C6B-D6C7DFDC589F}" vid="{4A3C46E8-61CC-4603-A589-7422A47A8E4A}"/>
+    </a:ext>
+  </a:extLst>
+</a:theme>
 </file>
</xml_diff>